<commit_message>
Adds more explanatory graphics
</commit_message>
<xml_diff>
--- a/Domain_Model_Presentation.pptx
+++ b/Domain_Model_Presentation.pptx
@@ -1418,7 +1418,193 @@
               <a:rPr b="0" lang="en-US" sz="4400" spc="-1" strike="noStrike">
                 <a:latin typeface="Arial"/>
               </a:rPr>
-              <a:t>Click to edit the title text format</a:t>
+              <a:t>C</a:t>
+            </a:r>
+            <a:r>
+              <a:rPr b="0" lang="en-US" sz="4400" spc="-1" strike="noStrike">
+                <a:latin typeface="Arial"/>
+              </a:rPr>
+              <a:t>li</a:t>
+            </a:r>
+            <a:r>
+              <a:rPr b="0" lang="en-US" sz="4400" spc="-1" strike="noStrike">
+                <a:latin typeface="Arial"/>
+              </a:rPr>
+              <a:t>c</a:t>
+            </a:r>
+            <a:r>
+              <a:rPr b="0" lang="en-US" sz="4400" spc="-1" strike="noStrike">
+                <a:latin typeface="Arial"/>
+              </a:rPr>
+              <a:t>k</a:t>
+            </a:r>
+            <a:r>
+              <a:rPr b="0" lang="en-US" sz="4400" spc="-1" strike="noStrike">
+                <a:latin typeface="Arial"/>
+              </a:rPr>
+              <a:t> </a:t>
+            </a:r>
+            <a:r>
+              <a:rPr b="0" lang="en-US" sz="4400" spc="-1" strike="noStrike">
+                <a:latin typeface="Arial"/>
+              </a:rPr>
+              <a:t>t</a:t>
+            </a:r>
+            <a:r>
+              <a:rPr b="0" lang="en-US" sz="4400" spc="-1" strike="noStrike">
+                <a:latin typeface="Arial"/>
+              </a:rPr>
+              <a:t>o</a:t>
+            </a:r>
+            <a:r>
+              <a:rPr b="0" lang="en-US" sz="4400" spc="-1" strike="noStrike">
+                <a:latin typeface="Arial"/>
+              </a:rPr>
+              <a:t> </a:t>
+            </a:r>
+            <a:r>
+              <a:rPr b="0" lang="en-US" sz="4400" spc="-1" strike="noStrike">
+                <a:latin typeface="Arial"/>
+              </a:rPr>
+              <a:t>e</a:t>
+            </a:r>
+            <a:r>
+              <a:rPr b="0" lang="en-US" sz="4400" spc="-1" strike="noStrike">
+                <a:latin typeface="Arial"/>
+              </a:rPr>
+              <a:t>d</a:t>
+            </a:r>
+            <a:r>
+              <a:rPr b="0" lang="en-US" sz="4400" spc="-1" strike="noStrike">
+                <a:latin typeface="Arial"/>
+              </a:rPr>
+              <a:t>i</a:t>
+            </a:r>
+            <a:r>
+              <a:rPr b="0" lang="en-US" sz="4400" spc="-1" strike="noStrike">
+                <a:latin typeface="Arial"/>
+              </a:rPr>
+              <a:t>t </a:t>
+            </a:r>
+            <a:r>
+              <a:rPr b="0" lang="en-US" sz="4400" spc="-1" strike="noStrike">
+                <a:latin typeface="Arial"/>
+              </a:rPr>
+              <a:t>t</a:t>
+            </a:r>
+            <a:r>
+              <a:rPr b="0" lang="en-US" sz="4400" spc="-1" strike="noStrike">
+                <a:latin typeface="Arial"/>
+              </a:rPr>
+              <a:t>h</a:t>
+            </a:r>
+            <a:r>
+              <a:rPr b="0" lang="en-US" sz="4400" spc="-1" strike="noStrike">
+                <a:latin typeface="Arial"/>
+              </a:rPr>
+              <a:t>e</a:t>
+            </a:r>
+            <a:r>
+              <a:rPr b="0" lang="en-US" sz="4400" spc="-1" strike="noStrike">
+                <a:latin typeface="Arial"/>
+              </a:rPr>
+              <a:t> </a:t>
+            </a:r>
+            <a:r>
+              <a:rPr b="0" lang="en-US" sz="4400" spc="-1" strike="noStrike">
+                <a:latin typeface="Arial"/>
+              </a:rPr>
+              <a:t>t</a:t>
+            </a:r>
+            <a:r>
+              <a:rPr b="0" lang="en-US" sz="4400" spc="-1" strike="noStrike">
+                <a:latin typeface="Arial"/>
+              </a:rPr>
+              <a:t>i</a:t>
+            </a:r>
+            <a:r>
+              <a:rPr b="0" lang="en-US" sz="4400" spc="-1" strike="noStrike">
+                <a:latin typeface="Arial"/>
+              </a:rPr>
+              <a:t>t</a:t>
+            </a:r>
+            <a:r>
+              <a:rPr b="0" lang="en-US" sz="4400" spc="-1" strike="noStrike">
+                <a:latin typeface="Arial"/>
+              </a:rPr>
+              <a:t>l</a:t>
+            </a:r>
+            <a:r>
+              <a:rPr b="0" lang="en-US" sz="4400" spc="-1" strike="noStrike">
+                <a:latin typeface="Arial"/>
+              </a:rPr>
+              <a:t>e</a:t>
+            </a:r>
+            <a:r>
+              <a:rPr b="0" lang="en-US" sz="4400" spc="-1" strike="noStrike">
+                <a:latin typeface="Arial"/>
+              </a:rPr>
+              <a:t> </a:t>
+            </a:r>
+            <a:r>
+              <a:rPr b="0" lang="en-US" sz="4400" spc="-1" strike="noStrike">
+                <a:latin typeface="Arial"/>
+              </a:rPr>
+              <a:t>t</a:t>
+            </a:r>
+            <a:r>
+              <a:rPr b="0" lang="en-US" sz="4400" spc="-1" strike="noStrike">
+                <a:latin typeface="Arial"/>
+              </a:rPr>
+              <a:t>e</a:t>
+            </a:r>
+            <a:r>
+              <a:rPr b="0" lang="en-US" sz="4400" spc="-1" strike="noStrike">
+                <a:latin typeface="Arial"/>
+              </a:rPr>
+              <a:t>x</a:t>
+            </a:r>
+            <a:r>
+              <a:rPr b="0" lang="en-US" sz="4400" spc="-1" strike="noStrike">
+                <a:latin typeface="Arial"/>
+              </a:rPr>
+              <a:t>t </a:t>
+            </a:r>
+            <a:r>
+              <a:rPr b="0" lang="en-US" sz="4400" spc="-1" strike="noStrike">
+                <a:latin typeface="Arial"/>
+              </a:rPr>
+              <a:t>f</a:t>
+            </a:r>
+            <a:r>
+              <a:rPr b="0" lang="en-US" sz="4400" spc="-1" strike="noStrike">
+                <a:latin typeface="Arial"/>
+              </a:rPr>
+              <a:t>o</a:t>
+            </a:r>
+            <a:r>
+              <a:rPr b="0" lang="en-US" sz="4400" spc="-1" strike="noStrike">
+                <a:latin typeface="Arial"/>
+              </a:rPr>
+              <a:t>r</a:t>
+            </a:r>
+            <a:r>
+              <a:rPr b="0" lang="en-US" sz="4400" spc="-1" strike="noStrike">
+                <a:latin typeface="Arial"/>
+              </a:rPr>
+              <a:t>m</a:t>
+            </a:r>
+            <a:r>
+              <a:rPr b="0" lang="en-US" sz="4400" spc="-1" strike="noStrike">
+                <a:latin typeface="Arial"/>
+              </a:rPr>
+              <a:t>a</a:t>
+            </a:r>
+            <a:r>
+              <a:rPr b="0" lang="en-US" sz="4400" spc="-1" strike="noStrike">
+                <a:latin typeface="Arial"/>
+              </a:rPr>
+              <a:t>t</a:t>
             </a:r>
             <a:endParaRPr b="0" lang="en-US" sz="4400" spc="-1" strike="noStrike">
               <a:latin typeface="Arial"/>
@@ -1703,7 +1889,7 @@
           </a:bodyPr>
           <a:p>
             <a:pPr algn="r"/>
-            <a:fld id="{B709A0FD-95D7-4625-A6F9-49C6A55E044C}" type="slidenum">
+            <a:fld id="{2A753991-3C0E-43F5-95BD-3346EF23CFCA}" type="slidenum">
               <a:rPr b="0" lang="en-US" sz="1400" spc="-1" strike="noStrike">
                 <a:latin typeface="Times New Roman"/>
               </a:rPr>
@@ -1807,6 +1993,38 @@
           <a:fontRef idx="minor"/>
         </p:style>
       </p:sp>
+      <p:sp>
+        <p:nvSpPr>
+          <p:cNvPr id="43" name="CustomShape 2"/>
+          <p:cNvSpPr/>
+          <p:nvPr/>
+        </p:nvSpPr>
+        <p:spPr>
+          <a:xfrm>
+            <a:off x="1337400" y="2731320"/>
+            <a:ext cx="640080" cy="552240"/>
+          </a:xfrm>
+          <a:prstGeom prst="donut">
+            <a:avLst>
+              <a:gd name="adj" fmla="val 11490"/>
+            </a:avLst>
+          </a:prstGeom>
+          <a:solidFill>
+            <a:srgbClr val="00a933"/>
+          </a:solidFill>
+          <a:ln>
+            <a:solidFill>
+              <a:srgbClr val="3465a4"/>
+            </a:solidFill>
+          </a:ln>
+        </p:spPr>
+        <p:style>
+          <a:lnRef idx="0"/>
+          <a:fillRef idx="0"/>
+          <a:effectRef idx="0"/>
+          <a:fontRef idx="minor"/>
+        </p:style>
+      </p:sp>
     </p:spTree>
   </p:cSld>
   <mc:AlternateContent>
@@ -1839,7 +2057,7 @@
       </p:grpSpPr>
       <p:pic>
         <p:nvPicPr>
-          <p:cNvPr id="43" name="" descr=""/>
+          <p:cNvPr id="44" name="" descr=""/>
           <p:cNvPicPr/>
           <p:nvPr/>
         </p:nvPicPr>
@@ -1862,7 +2080,7 @@
       </p:pic>
       <p:sp>
         <p:nvSpPr>
-          <p:cNvPr id="44" name="CustomShape 1"/>
+          <p:cNvPr id="45" name="CustomShape 1"/>
           <p:cNvSpPr/>
           <p:nvPr/>
         </p:nvSpPr>
@@ -1894,7 +2112,7 @@
       </p:sp>
       <p:sp>
         <p:nvSpPr>
-          <p:cNvPr id="45" name="CustomShape 2"/>
+          <p:cNvPr id="46" name="CustomShape 2"/>
           <p:cNvSpPr/>
           <p:nvPr/>
         </p:nvSpPr>
@@ -1910,6 +2128,70 @@
           </a:prstGeom>
           <a:solidFill>
             <a:srgbClr val="ff0000"/>
+          </a:solidFill>
+          <a:ln>
+            <a:solidFill>
+              <a:srgbClr val="3465a4"/>
+            </a:solidFill>
+          </a:ln>
+        </p:spPr>
+        <p:style>
+          <a:lnRef idx="0"/>
+          <a:fillRef idx="0"/>
+          <a:effectRef idx="0"/>
+          <a:fontRef idx="minor"/>
+        </p:style>
+      </p:sp>
+      <p:sp>
+        <p:nvSpPr>
+          <p:cNvPr id="47" name="CustomShape 3"/>
+          <p:cNvSpPr/>
+          <p:nvPr/>
+        </p:nvSpPr>
+        <p:spPr>
+          <a:xfrm>
+            <a:off x="1353240" y="2726280"/>
+            <a:ext cx="640080" cy="552240"/>
+          </a:xfrm>
+          <a:prstGeom prst="donut">
+            <a:avLst>
+              <a:gd name="adj" fmla="val 11490"/>
+            </a:avLst>
+          </a:prstGeom>
+          <a:solidFill>
+            <a:srgbClr val="00a933"/>
+          </a:solidFill>
+          <a:ln>
+            <a:solidFill>
+              <a:srgbClr val="3465a4"/>
+            </a:solidFill>
+          </a:ln>
+        </p:spPr>
+        <p:style>
+          <a:lnRef idx="0"/>
+          <a:fillRef idx="0"/>
+          <a:effectRef idx="0"/>
+          <a:fontRef idx="minor"/>
+        </p:style>
+      </p:sp>
+      <p:sp>
+        <p:nvSpPr>
+          <p:cNvPr id="48" name="CustomShape 4"/>
+          <p:cNvSpPr/>
+          <p:nvPr/>
+        </p:nvSpPr>
+        <p:spPr>
+          <a:xfrm>
+            <a:off x="4845600" y="2762640"/>
+            <a:ext cx="640080" cy="473760"/>
+          </a:xfrm>
+          <a:prstGeom prst="donut">
+            <a:avLst>
+              <a:gd name="adj" fmla="val 11490"/>
+            </a:avLst>
+          </a:prstGeom>
+          <a:solidFill>
+            <a:srgbClr val="00a933"/>
           </a:solidFill>
           <a:ln>
             <a:solidFill>
@@ -1956,7 +2238,7 @@
       </p:grpSpPr>
       <p:pic>
         <p:nvPicPr>
-          <p:cNvPr id="46" name="" descr=""/>
+          <p:cNvPr id="49" name="" descr=""/>
           <p:cNvPicPr/>
           <p:nvPr/>
         </p:nvPicPr>
@@ -1979,7 +2261,7 @@
       </p:pic>
       <p:sp>
         <p:nvSpPr>
-          <p:cNvPr id="47" name="CustomShape 1"/>
+          <p:cNvPr id="50" name="CustomShape 1"/>
           <p:cNvSpPr/>
           <p:nvPr/>
         </p:nvSpPr>
@@ -2011,7 +2293,7 @@
       </p:sp>
       <p:sp>
         <p:nvSpPr>
-          <p:cNvPr id="48" name="CustomShape 2"/>
+          <p:cNvPr id="51" name="CustomShape 2"/>
           <p:cNvSpPr/>
           <p:nvPr/>
         </p:nvSpPr>
@@ -2027,6 +2309,70 @@
           </a:prstGeom>
           <a:solidFill>
             <a:srgbClr val="ff0000"/>
+          </a:solidFill>
+          <a:ln>
+            <a:solidFill>
+              <a:srgbClr val="3465a4"/>
+            </a:solidFill>
+          </a:ln>
+        </p:spPr>
+        <p:style>
+          <a:lnRef idx="0"/>
+          <a:fillRef idx="0"/>
+          <a:effectRef idx="0"/>
+          <a:fontRef idx="minor"/>
+        </p:style>
+      </p:sp>
+      <p:sp>
+        <p:nvSpPr>
+          <p:cNvPr id="52" name="CustomShape 3"/>
+          <p:cNvSpPr/>
+          <p:nvPr/>
+        </p:nvSpPr>
+        <p:spPr>
+          <a:xfrm>
+            <a:off x="1344600" y="2714040"/>
+            <a:ext cx="640080" cy="552240"/>
+          </a:xfrm>
+          <a:prstGeom prst="donut">
+            <a:avLst>
+              <a:gd name="adj" fmla="val 11490"/>
+            </a:avLst>
+          </a:prstGeom>
+          <a:solidFill>
+            <a:srgbClr val="00a933"/>
+          </a:solidFill>
+          <a:ln>
+            <a:solidFill>
+              <a:srgbClr val="3465a4"/>
+            </a:solidFill>
+          </a:ln>
+        </p:spPr>
+        <p:style>
+          <a:lnRef idx="0"/>
+          <a:fillRef idx="0"/>
+          <a:effectRef idx="0"/>
+          <a:fontRef idx="minor"/>
+        </p:style>
+      </p:sp>
+      <p:sp>
+        <p:nvSpPr>
+          <p:cNvPr id="53" name="CustomShape 4"/>
+          <p:cNvSpPr/>
+          <p:nvPr/>
+        </p:nvSpPr>
+        <p:spPr>
+          <a:xfrm>
+            <a:off x="8076960" y="2714400"/>
+            <a:ext cx="640080" cy="552240"/>
+          </a:xfrm>
+          <a:prstGeom prst="donut">
+            <a:avLst>
+              <a:gd name="adj" fmla="val 11490"/>
+            </a:avLst>
+          </a:prstGeom>
+          <a:solidFill>
+            <a:srgbClr val="00a933"/>
           </a:solidFill>
           <a:ln>
             <a:solidFill>
@@ -2073,7 +2419,7 @@
       </p:grpSpPr>
       <p:pic>
         <p:nvPicPr>
-          <p:cNvPr id="49" name="" descr=""/>
+          <p:cNvPr id="54" name="" descr=""/>
           <p:cNvPicPr/>
           <p:nvPr/>
         </p:nvPicPr>
@@ -2096,13 +2442,13 @@
       </p:pic>
       <p:sp>
         <p:nvSpPr>
-          <p:cNvPr id="50" name="CustomShape 1"/>
+          <p:cNvPr id="55" name="CustomShape 1"/>
           <p:cNvSpPr/>
           <p:nvPr/>
         </p:nvSpPr>
         <p:spPr>
           <a:xfrm>
-            <a:off x="6881400" y="2983320"/>
+            <a:off x="6881400" y="3019320"/>
             <a:ext cx="640080" cy="552240"/>
           </a:xfrm>
           <a:prstGeom prst="donut">
@@ -2128,13 +2474,13 @@
       </p:sp>
       <p:sp>
         <p:nvSpPr>
-          <p:cNvPr id="51" name="CustomShape 2"/>
+          <p:cNvPr id="56" name="CustomShape 2"/>
           <p:cNvSpPr/>
           <p:nvPr/>
         </p:nvSpPr>
         <p:spPr>
           <a:xfrm>
-            <a:off x="5873400" y="2983320"/>
+            <a:off x="5873400" y="3019320"/>
             <a:ext cx="640080" cy="552240"/>
           </a:xfrm>
           <a:prstGeom prst="donut">
@@ -2144,6 +2490,70 @@
           </a:prstGeom>
           <a:solidFill>
             <a:srgbClr val="ff0000"/>
+          </a:solidFill>
+          <a:ln>
+            <a:solidFill>
+              <a:srgbClr val="3465a4"/>
+            </a:solidFill>
+          </a:ln>
+        </p:spPr>
+        <p:style>
+          <a:lnRef idx="0"/>
+          <a:fillRef idx="0"/>
+          <a:effectRef idx="0"/>
+          <a:fontRef idx="minor"/>
+        </p:style>
+      </p:sp>
+      <p:sp>
+        <p:nvSpPr>
+          <p:cNvPr id="57" name="CustomShape 3"/>
+          <p:cNvSpPr/>
+          <p:nvPr/>
+        </p:nvSpPr>
+        <p:spPr>
+          <a:xfrm>
+            <a:off x="4872960" y="2714400"/>
+            <a:ext cx="640080" cy="552240"/>
+          </a:xfrm>
+          <a:prstGeom prst="donut">
+            <a:avLst>
+              <a:gd name="adj" fmla="val 11490"/>
+            </a:avLst>
+          </a:prstGeom>
+          <a:solidFill>
+            <a:srgbClr val="00a933"/>
+          </a:solidFill>
+          <a:ln>
+            <a:solidFill>
+              <a:srgbClr val="3465a4"/>
+            </a:solidFill>
+          </a:ln>
+        </p:spPr>
+        <p:style>
+          <a:lnRef idx="0"/>
+          <a:fillRef idx="0"/>
+          <a:effectRef idx="0"/>
+          <a:fontRef idx="minor"/>
+        </p:style>
+      </p:sp>
+      <p:sp>
+        <p:nvSpPr>
+          <p:cNvPr id="58" name="CustomShape 4"/>
+          <p:cNvSpPr/>
+          <p:nvPr/>
+        </p:nvSpPr>
+        <p:spPr>
+          <a:xfrm>
+            <a:off x="8077320" y="2714760"/>
+            <a:ext cx="640080" cy="552240"/>
+          </a:xfrm>
+          <a:prstGeom prst="donut">
+            <a:avLst>
+              <a:gd name="adj" fmla="val 11490"/>
+            </a:avLst>
+          </a:prstGeom>
+          <a:solidFill>
+            <a:srgbClr val="00a933"/>
           </a:solidFill>
           <a:ln>
             <a:solidFill>
@@ -2190,7 +2600,7 @@
       </p:grpSpPr>
       <p:pic>
         <p:nvPicPr>
-          <p:cNvPr id="52" name="" descr=""/>
+          <p:cNvPr id="59" name="" descr=""/>
           <p:cNvPicPr/>
           <p:nvPr/>
         </p:nvPicPr>
@@ -2213,7 +2623,7 @@
       </p:pic>
       <p:sp>
         <p:nvSpPr>
-          <p:cNvPr id="53" name="CustomShape 1"/>
+          <p:cNvPr id="60" name="CustomShape 1"/>
           <p:cNvSpPr/>
           <p:nvPr/>
         </p:nvSpPr>
@@ -2229,6 +2639,38 @@
           </a:prstGeom>
           <a:solidFill>
             <a:srgbClr val="ff0000"/>
+          </a:solidFill>
+          <a:ln>
+            <a:solidFill>
+              <a:srgbClr val="3465a4"/>
+            </a:solidFill>
+          </a:ln>
+        </p:spPr>
+        <p:style>
+          <a:lnRef idx="0"/>
+          <a:fillRef idx="0"/>
+          <a:effectRef idx="0"/>
+          <a:fontRef idx="minor"/>
+        </p:style>
+      </p:sp>
+      <p:sp>
+        <p:nvSpPr>
+          <p:cNvPr id="61" name="CustomShape 2"/>
+          <p:cNvSpPr/>
+          <p:nvPr/>
+        </p:nvSpPr>
+        <p:spPr>
+          <a:xfrm>
+            <a:off x="8077320" y="2714760"/>
+            <a:ext cx="640080" cy="552240"/>
+          </a:xfrm>
+          <a:prstGeom prst="donut">
+            <a:avLst>
+              <a:gd name="adj" fmla="val 11490"/>
+            </a:avLst>
+          </a:prstGeom>
+          <a:solidFill>
+            <a:srgbClr val="00a933"/>
           </a:solidFill>
           <a:ln>
             <a:solidFill>

</xml_diff>

<commit_message>
Adds notes to presentation
</commit_message>
<xml_diff>
--- a/Domain_Model_Presentation.pptx
+++ b/Domain_Model_Presentation.pptx
@@ -4,16 +4,795 @@
   <p:sldMasterIdLst>
     <p:sldMasterId id="2147483648" r:id="rId2"/>
   </p:sldMasterIdLst>
+  <p:notesMasterIdLst>
+    <p:notesMasterId r:id="rId3"/>
+  </p:notesMasterIdLst>
   <p:sldIdLst>
-    <p:sldId id="256" r:id="rId3"/>
-    <p:sldId id="257" r:id="rId4"/>
-    <p:sldId id="258" r:id="rId5"/>
-    <p:sldId id="259" r:id="rId6"/>
-    <p:sldId id="260" r:id="rId7"/>
+    <p:sldId id="256" r:id="rId4"/>
+    <p:sldId id="257" r:id="rId5"/>
+    <p:sldId id="258" r:id="rId6"/>
+    <p:sldId id="259" r:id="rId7"/>
+    <p:sldId id="260" r:id="rId8"/>
   </p:sldIdLst>
   <p:sldSz cx="10080625" cy="5670550"/>
   <p:notesSz cx="7772400" cy="10058400"/>
 </p:presentation>
+</file>
+
+<file path=ppt/notesMasters/notesMaster1.xml><?xml version="1.0" encoding="utf-8"?>
+<p:notesMaster xmlns:a="http://schemas.openxmlformats.org/drawingml/2006/main" xmlns:p="http://schemas.openxmlformats.org/presentationml/2006/main" xmlns:r="http://schemas.openxmlformats.org/officeDocument/2006/relationships" xmlns:p14="http://schemas.microsoft.com/office/powerpoint/2010/main" xmlns:p15="http://schemas.microsoft.com/office/powerpoint/2012/main" xmlns:mc="http://schemas.openxmlformats.org/markup-compatibility/2006">
+  <p:cSld>
+    <p:spTree>
+      <p:nvGrpSpPr>
+        <p:cNvPr id="1" name=""/>
+        <p:cNvGrpSpPr/>
+        <p:nvPr/>
+      </p:nvGrpSpPr>
+      <p:grpSpPr>
+        <a:xfrm>
+          <a:off x="0" y="0"/>
+          <a:ext cx="0" cy="0"/>
+          <a:chOff x="0" y="0"/>
+          <a:chExt cx="0" cy="0"/>
+        </a:xfrm>
+      </p:grpSpPr>
+      <p:sp>
+        <p:nvSpPr>
+          <p:cNvPr id="38" name="PlaceHolder 1"/>
+          <p:cNvSpPr>
+            <a:spLocks noGrp="1"/>
+          </p:cNvSpPr>
+          <p:nvPr>
+            <p:ph type="sldImg"/>
+          </p:nvPr>
+        </p:nvSpPr>
+        <p:spPr>
+          <a:xfrm>
+            <a:off x="533520" y="764280"/>
+            <a:ext cx="6704640" cy="3771360"/>
+          </a:xfrm>
+          <a:prstGeom prst="rect">
+            <a:avLst/>
+          </a:prstGeom>
+        </p:spPr>
+        <p:txBody>
+          <a:bodyPr lIns="0" rIns="0" tIns="0" bIns="0" anchor="ctr">
+            <a:noAutofit/>
+          </a:bodyPr>
+          <a:p>
+            <a:pPr algn="ctr"/>
+            <a:r>
+              <a:rPr b="0" lang="en-US" sz="4400" spc="-1" strike="noStrike">
+                <a:latin typeface="Arial"/>
+              </a:rPr>
+              <a:t>Click to move the slide</a:t>
+            </a:r>
+            <a:endParaRPr b="0" lang="en-US" sz="4400" spc="-1" strike="noStrike">
+              <a:latin typeface="Arial"/>
+            </a:endParaRPr>
+          </a:p>
+        </p:txBody>
+      </p:sp>
+      <p:sp>
+        <p:nvSpPr>
+          <p:cNvPr id="39" name="PlaceHolder 2"/>
+          <p:cNvSpPr>
+            <a:spLocks noGrp="1"/>
+          </p:cNvSpPr>
+          <p:nvPr>
+            <p:ph type="body"/>
+          </p:nvPr>
+        </p:nvSpPr>
+        <p:spPr>
+          <a:xfrm>
+            <a:off x="777240" y="4777560"/>
+            <a:ext cx="6217560" cy="4525920"/>
+          </a:xfrm>
+          <a:prstGeom prst="rect">
+            <a:avLst/>
+          </a:prstGeom>
+        </p:spPr>
+        <p:txBody>
+          <a:bodyPr lIns="0" rIns="0" tIns="0" bIns="0">
+            <a:noAutofit/>
+          </a:bodyPr>
+          <a:p>
+            <a:r>
+              <a:rPr b="0" lang="en-US" sz="2000" spc="-1" strike="noStrike">
+                <a:latin typeface="Arial"/>
+              </a:rPr>
+              <a:t>Click to edit the notes format</a:t>
+            </a:r>
+            <a:endParaRPr b="0" lang="en-US" sz="2000" spc="-1" strike="noStrike">
+              <a:latin typeface="Arial"/>
+            </a:endParaRPr>
+          </a:p>
+        </p:txBody>
+      </p:sp>
+      <p:sp>
+        <p:nvSpPr>
+          <p:cNvPr id="40" name="PlaceHolder 3"/>
+          <p:cNvSpPr>
+            <a:spLocks noGrp="1"/>
+          </p:cNvSpPr>
+          <p:nvPr>
+            <p:ph type="hdr"/>
+          </p:nvPr>
+        </p:nvSpPr>
+        <p:spPr>
+          <a:xfrm>
+            <a:off x="0" y="0"/>
+            <a:ext cx="3372840" cy="502560"/>
+          </a:xfrm>
+          <a:prstGeom prst="rect">
+            <a:avLst/>
+          </a:prstGeom>
+        </p:spPr>
+        <p:txBody>
+          <a:bodyPr lIns="0" rIns="0" tIns="0" bIns="0">
+            <a:noAutofit/>
+          </a:bodyPr>
+          <a:p>
+            <a:r>
+              <a:rPr b="0" lang="en-US" sz="1400" spc="-1" strike="noStrike">
+                <a:latin typeface="Times New Roman"/>
+              </a:rPr>
+              <a:t>&lt;header&gt;</a:t>
+            </a:r>
+            <a:endParaRPr b="0" lang="en-US" sz="1400" spc="-1" strike="noStrike">
+              <a:latin typeface="Times New Roman"/>
+            </a:endParaRPr>
+          </a:p>
+        </p:txBody>
+      </p:sp>
+      <p:sp>
+        <p:nvSpPr>
+          <p:cNvPr id="41" name="PlaceHolder 4"/>
+          <p:cNvSpPr>
+            <a:spLocks noGrp="1"/>
+          </p:cNvSpPr>
+          <p:nvPr>
+            <p:ph type="dt"/>
+          </p:nvPr>
+        </p:nvSpPr>
+        <p:spPr>
+          <a:xfrm>
+            <a:off x="4399200" y="0"/>
+            <a:ext cx="3372840" cy="502560"/>
+          </a:xfrm>
+          <a:prstGeom prst="rect">
+            <a:avLst/>
+          </a:prstGeom>
+        </p:spPr>
+        <p:txBody>
+          <a:bodyPr lIns="0" rIns="0" tIns="0" bIns="0">
+            <a:noAutofit/>
+          </a:bodyPr>
+          <a:p>
+            <a:pPr algn="r"/>
+            <a:r>
+              <a:rPr b="0" lang="en-US" sz="1400" spc="-1" strike="noStrike">
+                <a:latin typeface="Times New Roman"/>
+              </a:rPr>
+              <a:t>&lt;date/time&gt;</a:t>
+            </a:r>
+            <a:endParaRPr b="0" lang="en-US" sz="1400" spc="-1" strike="noStrike">
+              <a:latin typeface="Times New Roman"/>
+            </a:endParaRPr>
+          </a:p>
+        </p:txBody>
+      </p:sp>
+      <p:sp>
+        <p:nvSpPr>
+          <p:cNvPr id="42" name="PlaceHolder 5"/>
+          <p:cNvSpPr>
+            <a:spLocks noGrp="1"/>
+          </p:cNvSpPr>
+          <p:nvPr>
+            <p:ph type="ftr"/>
+          </p:nvPr>
+        </p:nvSpPr>
+        <p:spPr>
+          <a:xfrm>
+            <a:off x="0" y="9555480"/>
+            <a:ext cx="3372840" cy="502560"/>
+          </a:xfrm>
+          <a:prstGeom prst="rect">
+            <a:avLst/>
+          </a:prstGeom>
+        </p:spPr>
+        <p:txBody>
+          <a:bodyPr lIns="0" rIns="0" tIns="0" bIns="0" anchor="b">
+            <a:noAutofit/>
+          </a:bodyPr>
+          <a:p>
+            <a:r>
+              <a:rPr b="0" lang="en-US" sz="1400" spc="-1" strike="noStrike">
+                <a:latin typeface="Times New Roman"/>
+              </a:rPr>
+              <a:t>&lt;footer&gt;</a:t>
+            </a:r>
+            <a:endParaRPr b="0" lang="en-US" sz="1400" spc="-1" strike="noStrike">
+              <a:latin typeface="Times New Roman"/>
+            </a:endParaRPr>
+          </a:p>
+        </p:txBody>
+      </p:sp>
+      <p:sp>
+        <p:nvSpPr>
+          <p:cNvPr id="43" name="PlaceHolder 6"/>
+          <p:cNvSpPr>
+            <a:spLocks noGrp="1"/>
+          </p:cNvSpPr>
+          <p:nvPr>
+            <p:ph type="sldNum"/>
+          </p:nvPr>
+        </p:nvSpPr>
+        <p:spPr>
+          <a:xfrm>
+            <a:off x="4399200" y="9555480"/>
+            <a:ext cx="3372840" cy="502560"/>
+          </a:xfrm>
+          <a:prstGeom prst="rect">
+            <a:avLst/>
+          </a:prstGeom>
+        </p:spPr>
+        <p:txBody>
+          <a:bodyPr lIns="0" rIns="0" tIns="0" bIns="0" anchor="b">
+            <a:noAutofit/>
+          </a:bodyPr>
+          <a:p>
+            <a:pPr algn="r"/>
+            <a:fld id="{CDD1EF7D-B72D-4B33-ACAB-608F8D75046D}" type="slidenum">
+              <a:rPr b="0" lang="en-US" sz="1400" spc="-1" strike="noStrike">
+                <a:latin typeface="Times New Roman"/>
+              </a:rPr>
+              <a:t>&lt;number&gt;</a:t>
+            </a:fld>
+            <a:endParaRPr b="0" lang="en-US" sz="1400" spc="-1" strike="noStrike">
+              <a:latin typeface="Times New Roman"/>
+            </a:endParaRPr>
+          </a:p>
+        </p:txBody>
+      </p:sp>
+    </p:spTree>
+  </p:cSld>
+  <p:clrMap bg1="lt1" bg2="lt2" tx1="dk1" tx2="dk2" accent1="accent1" accent2="accent2" accent3="accent3" accent4="accent4" accent5="accent5" accent6="accent6" hlink="hlink" folHlink="folHlink"/>
+</p:notesMaster>
+</file>
+
+<file path=ppt/notesSlides/notesSlide1.xml><?xml version="1.0" encoding="utf-8"?>
+<p:notes xmlns:a="http://schemas.openxmlformats.org/drawingml/2006/main" xmlns:p="http://schemas.openxmlformats.org/presentationml/2006/main" xmlns:r="http://schemas.openxmlformats.org/officeDocument/2006/relationships" xmlns:p14="http://schemas.microsoft.com/office/powerpoint/2010/main" xmlns:p15="http://schemas.microsoft.com/office/powerpoint/2012/main" xmlns:mc="http://schemas.openxmlformats.org/markup-compatibility/2006">
+  <p:cSld>
+    <p:spTree>
+      <p:nvGrpSpPr>
+        <p:cNvPr id="1" name=""/>
+        <p:cNvGrpSpPr/>
+        <p:nvPr/>
+      </p:nvGrpSpPr>
+      <p:grpSpPr>
+        <a:xfrm>
+          <a:off x="0" y="0"/>
+          <a:ext cx="0" cy="0"/>
+          <a:chOff x="0" y="0"/>
+          <a:chExt cx="0" cy="0"/>
+        </a:xfrm>
+      </p:grpSpPr>
+      <p:sp>
+        <p:nvSpPr>
+          <p:cNvPr id="65" name="PlaceHolder 1"/>
+          <p:cNvSpPr>
+            <a:spLocks noGrp="1"/>
+          </p:cNvSpPr>
+          <p:nvPr>
+            <p:ph type="sldImg"/>
+          </p:nvPr>
+        </p:nvSpPr>
+        <p:spPr>
+          <a:xfrm>
+            <a:off x="533520" y="764280"/>
+            <a:ext cx="6704640" cy="3771360"/>
+          </a:xfrm>
+          <a:prstGeom prst="rect">
+            <a:avLst/>
+          </a:prstGeom>
+        </p:spPr>
+      </p:sp>
+      <p:sp>
+        <p:nvSpPr>
+          <p:cNvPr id="66" name="PlaceHolder 2"/>
+          <p:cNvSpPr>
+            <a:spLocks noGrp="1"/>
+          </p:cNvSpPr>
+          <p:nvPr>
+            <p:ph type="body"/>
+          </p:nvPr>
+        </p:nvSpPr>
+        <p:spPr>
+          <a:xfrm>
+            <a:off x="777240" y="4777560"/>
+            <a:ext cx="6217560" cy="4525920"/>
+          </a:xfrm>
+          <a:prstGeom prst="rect">
+            <a:avLst/>
+          </a:prstGeom>
+        </p:spPr>
+        <p:txBody>
+          <a:bodyPr lIns="0" rIns="0" tIns="0" bIns="0">
+            <a:noAutofit/>
+          </a:bodyPr>
+          <a:p>
+            <a:r>
+              <a:rPr b="0" lang="en-US" sz="2000" spc="-1" strike="noStrike">
+                <a:latin typeface="Arial"/>
+              </a:rPr>
+              <a:t>So you can see here that a </a:t>
+            </a:r>
+            <a:r>
+              <a:rPr b="1" lang="en-US" sz="2000" spc="-1" strike="noStrike">
+                <a:latin typeface="Arial"/>
+              </a:rPr>
+              <a:t>user</a:t>
+            </a:r>
+            <a:r>
+              <a:rPr b="0" lang="en-US" sz="2000" spc="-1" strike="noStrike">
+                <a:latin typeface="Arial"/>
+              </a:rPr>
+              <a:t> could have be free a </a:t>
+            </a:r>
+            <a:r>
+              <a:rPr b="0" lang="en-US" sz="2000" spc="-1" strike="noStrike">
+                <a:latin typeface="Arial"/>
+              </a:rPr>
+              <a:t>variety of </a:t>
+            </a:r>
+            <a:r>
+              <a:rPr b="1" lang="en-US" sz="2000" spc="-1" strike="noStrike">
+                <a:latin typeface="Arial"/>
+              </a:rPr>
+              <a:t>times</a:t>
+            </a:r>
+            <a:r>
+              <a:rPr b="0" lang="en-US" sz="2000" spc="-1" strike="noStrike">
+                <a:latin typeface="Arial"/>
+              </a:rPr>
+              <a:t> during the week or not at all.</a:t>
+            </a:r>
+            <a:endParaRPr b="0" lang="en-US" sz="2000" spc="-1" strike="noStrike">
+              <a:latin typeface="Arial"/>
+            </a:endParaRPr>
+          </a:p>
+        </p:txBody>
+      </p:sp>
+    </p:spTree>
+  </p:cSld>
+</p:notes>
+</file>
+
+<file path=ppt/notesSlides/notesSlide2.xml><?xml version="1.0" encoding="utf-8"?>
+<p:notes xmlns:a="http://schemas.openxmlformats.org/drawingml/2006/main" xmlns:p="http://schemas.openxmlformats.org/presentationml/2006/main" xmlns:r="http://schemas.openxmlformats.org/officeDocument/2006/relationships" xmlns:p14="http://schemas.microsoft.com/office/powerpoint/2010/main" xmlns:p15="http://schemas.microsoft.com/office/powerpoint/2012/main" xmlns:mc="http://schemas.openxmlformats.org/markup-compatibility/2006">
+  <p:cSld>
+    <p:spTree>
+      <p:nvGrpSpPr>
+        <p:cNvPr id="1" name=""/>
+        <p:cNvGrpSpPr/>
+        <p:nvPr/>
+      </p:nvGrpSpPr>
+      <p:grpSpPr>
+        <a:xfrm>
+          <a:off x="0" y="0"/>
+          <a:ext cx="0" cy="0"/>
+          <a:chOff x="0" y="0"/>
+          <a:chExt cx="0" cy="0"/>
+        </a:xfrm>
+      </p:grpSpPr>
+      <p:sp>
+        <p:nvSpPr>
+          <p:cNvPr id="67" name="PlaceHolder 1"/>
+          <p:cNvSpPr>
+            <a:spLocks noGrp="1"/>
+          </p:cNvSpPr>
+          <p:nvPr>
+            <p:ph type="sldImg"/>
+          </p:nvPr>
+        </p:nvSpPr>
+        <p:spPr>
+          <a:xfrm>
+            <a:off x="533520" y="764280"/>
+            <a:ext cx="6704640" cy="3771360"/>
+          </a:xfrm>
+          <a:prstGeom prst="rect">
+            <a:avLst/>
+          </a:prstGeom>
+        </p:spPr>
+      </p:sp>
+      <p:sp>
+        <p:nvSpPr>
+          <p:cNvPr id="68" name="PlaceHolder 2"/>
+          <p:cNvSpPr>
+            <a:spLocks noGrp="1"/>
+          </p:cNvSpPr>
+          <p:nvPr>
+            <p:ph type="body"/>
+          </p:nvPr>
+        </p:nvSpPr>
+        <p:spPr>
+          <a:xfrm>
+            <a:off x="777240" y="4777560"/>
+            <a:ext cx="6217560" cy="4525920"/>
+          </a:xfrm>
+          <a:prstGeom prst="rect">
+            <a:avLst/>
+          </a:prstGeom>
+        </p:spPr>
+        <p:txBody>
+          <a:bodyPr lIns="0" rIns="0" tIns="0" bIns="0">
+            <a:noAutofit/>
+          </a:bodyPr>
+          <a:p>
+            <a:r>
+              <a:rPr b="0" lang="en-US" sz="2000" spc="-1" strike="noStrike">
+                <a:latin typeface="Arial"/>
+              </a:rPr>
+              <a:t>Similarly, a </a:t>
+            </a:r>
+            <a:r>
+              <a:rPr b="1" lang="en-US" sz="2000" spc="-1" strike="noStrike">
+                <a:latin typeface="Arial"/>
+              </a:rPr>
+              <a:t>user</a:t>
+            </a:r>
+            <a:r>
+              <a:rPr b="0" lang="en-US" sz="2000" spc="-1" strike="noStrike">
+                <a:latin typeface="Arial"/>
+              </a:rPr>
+              <a:t> could be a part of as many </a:t>
+            </a:r>
+            <a:r>
+              <a:rPr b="1" lang="en-US" sz="2000" spc="-1" strike="noStrike">
+                <a:latin typeface="Arial"/>
+              </a:rPr>
+              <a:t>groups</a:t>
+            </a:r>
+            <a:r>
+              <a:rPr b="0" lang="en-US" sz="2000" spc="-1" strike="noStrike">
+                <a:latin typeface="Arial"/>
+              </a:rPr>
+              <a:t> as possible, or none at all. However, a </a:t>
+            </a:r>
+            <a:r>
+              <a:rPr b="1" lang="en-US" sz="2000" spc="-1" strike="noStrike">
+                <a:latin typeface="Arial"/>
+              </a:rPr>
+              <a:t>group</a:t>
+            </a:r>
+            <a:r>
+              <a:rPr b="0" lang="en-US" sz="2000" spc="-1" strike="noStrike">
+                <a:latin typeface="Arial"/>
+              </a:rPr>
+              <a:t> has to have at least one </a:t>
+            </a:r>
+            <a:r>
+              <a:rPr b="1" lang="en-US" sz="2000" spc="-1" strike="noStrike">
+                <a:latin typeface="Arial"/>
+              </a:rPr>
+              <a:t>user</a:t>
+            </a:r>
+            <a:r>
+              <a:rPr b="0" lang="en-US" sz="2000" spc="-1" strike="noStrike">
+                <a:latin typeface="Arial"/>
+              </a:rPr>
+              <a:t> as a group member.</a:t>
+            </a:r>
+            <a:endParaRPr b="0" lang="en-US" sz="2000" spc="-1" strike="noStrike">
+              <a:latin typeface="Arial"/>
+            </a:endParaRPr>
+          </a:p>
+        </p:txBody>
+      </p:sp>
+    </p:spTree>
+  </p:cSld>
+</p:notes>
+</file>
+
+<file path=ppt/notesSlides/notesSlide3.xml><?xml version="1.0" encoding="utf-8"?>
+<p:notes xmlns:a="http://schemas.openxmlformats.org/drawingml/2006/main" xmlns:p="http://schemas.openxmlformats.org/presentationml/2006/main" xmlns:r="http://schemas.openxmlformats.org/officeDocument/2006/relationships" xmlns:p14="http://schemas.microsoft.com/office/powerpoint/2010/main" xmlns:p15="http://schemas.microsoft.com/office/powerpoint/2012/main" xmlns:mc="http://schemas.openxmlformats.org/markup-compatibility/2006">
+  <p:cSld>
+    <p:spTree>
+      <p:nvGrpSpPr>
+        <p:cNvPr id="1" name=""/>
+        <p:cNvGrpSpPr/>
+        <p:nvPr/>
+      </p:nvGrpSpPr>
+      <p:grpSpPr>
+        <a:xfrm>
+          <a:off x="0" y="0"/>
+          <a:ext cx="0" cy="0"/>
+          <a:chOff x="0" y="0"/>
+          <a:chExt cx="0" cy="0"/>
+        </a:xfrm>
+      </p:grpSpPr>
+      <p:sp>
+        <p:nvSpPr>
+          <p:cNvPr id="69" name="PlaceHolder 1"/>
+          <p:cNvSpPr>
+            <a:spLocks noGrp="1"/>
+          </p:cNvSpPr>
+          <p:nvPr>
+            <p:ph type="sldImg"/>
+          </p:nvPr>
+        </p:nvSpPr>
+        <p:spPr>
+          <a:xfrm>
+            <a:off x="533520" y="764280"/>
+            <a:ext cx="6704640" cy="3771360"/>
+          </a:xfrm>
+          <a:prstGeom prst="rect">
+            <a:avLst/>
+          </a:prstGeom>
+        </p:spPr>
+      </p:sp>
+      <p:sp>
+        <p:nvSpPr>
+          <p:cNvPr id="70" name="PlaceHolder 2"/>
+          <p:cNvSpPr>
+            <a:spLocks noGrp="1"/>
+          </p:cNvSpPr>
+          <p:nvPr>
+            <p:ph type="body"/>
+          </p:nvPr>
+        </p:nvSpPr>
+        <p:spPr>
+          <a:xfrm>
+            <a:off x="777240" y="4777560"/>
+            <a:ext cx="6217560" cy="4525920"/>
+          </a:xfrm>
+          <a:prstGeom prst="rect">
+            <a:avLst/>
+          </a:prstGeom>
+        </p:spPr>
+        <p:txBody>
+          <a:bodyPr lIns="0" rIns="0" tIns="0" bIns="0">
+            <a:noAutofit/>
+          </a:bodyPr>
+          <a:p>
+            <a:r>
+              <a:rPr b="0" lang="en-US" sz="2000" spc="-1" strike="noStrike">
+                <a:latin typeface="Arial"/>
+              </a:rPr>
+              <a:t>And finally, a </a:t>
+            </a:r>
+            <a:r>
+              <a:rPr b="1" lang="en-US" sz="2000" spc="-1" strike="noStrike">
+                <a:latin typeface="Arial"/>
+              </a:rPr>
+              <a:t>user</a:t>
+            </a:r>
+            <a:r>
+              <a:rPr b="0" lang="en-US" sz="2000" spc="-1" strike="noStrike">
+                <a:latin typeface="Arial"/>
+              </a:rPr>
+              <a:t> be a participant in as many </a:t>
+            </a:r>
+            <a:r>
+              <a:rPr b="1" lang="en-US" sz="2000" spc="-1" strike="noStrike">
+                <a:latin typeface="Arial"/>
+              </a:rPr>
+              <a:t>events</a:t>
+            </a:r>
+            <a:r>
+              <a:rPr b="0" lang="en-US" sz="2000" spc="-1" strike="noStrike">
+                <a:latin typeface="Arial"/>
+              </a:rPr>
+              <a:t> as they want, or none at all.</a:t>
+            </a:r>
+            <a:endParaRPr b="0" lang="en-US" sz="2000" spc="-1" strike="noStrike">
+              <a:latin typeface="Arial"/>
+            </a:endParaRPr>
+          </a:p>
+        </p:txBody>
+      </p:sp>
+    </p:spTree>
+  </p:cSld>
+</p:notes>
+</file>
+
+<file path=ppt/notesSlides/notesSlide4.xml><?xml version="1.0" encoding="utf-8"?>
+<p:notes xmlns:a="http://schemas.openxmlformats.org/drawingml/2006/main" xmlns:p="http://schemas.openxmlformats.org/presentationml/2006/main" xmlns:r="http://schemas.openxmlformats.org/officeDocument/2006/relationships" xmlns:p14="http://schemas.microsoft.com/office/powerpoint/2010/main" xmlns:p15="http://schemas.microsoft.com/office/powerpoint/2012/main" xmlns:mc="http://schemas.openxmlformats.org/markup-compatibility/2006">
+  <p:cSld>
+    <p:spTree>
+      <p:nvGrpSpPr>
+        <p:cNvPr id="1" name=""/>
+        <p:cNvGrpSpPr/>
+        <p:nvPr/>
+      </p:nvGrpSpPr>
+      <p:grpSpPr>
+        <a:xfrm>
+          <a:off x="0" y="0"/>
+          <a:ext cx="0" cy="0"/>
+          <a:chOff x="0" y="0"/>
+          <a:chExt cx="0" cy="0"/>
+        </a:xfrm>
+      </p:grpSpPr>
+      <p:sp>
+        <p:nvSpPr>
+          <p:cNvPr id="71" name="PlaceHolder 1"/>
+          <p:cNvSpPr>
+            <a:spLocks noGrp="1"/>
+          </p:cNvSpPr>
+          <p:nvPr>
+            <p:ph type="sldImg"/>
+          </p:nvPr>
+        </p:nvSpPr>
+        <p:spPr>
+          <a:xfrm>
+            <a:off x="533520" y="764280"/>
+            <a:ext cx="6704640" cy="3771360"/>
+          </a:xfrm>
+          <a:prstGeom prst="rect">
+            <a:avLst/>
+          </a:prstGeom>
+        </p:spPr>
+      </p:sp>
+      <p:sp>
+        <p:nvSpPr>
+          <p:cNvPr id="72" name="PlaceHolder 2"/>
+          <p:cNvSpPr>
+            <a:spLocks noGrp="1"/>
+          </p:cNvSpPr>
+          <p:nvPr>
+            <p:ph type="body"/>
+          </p:nvPr>
+        </p:nvSpPr>
+        <p:spPr>
+          <a:xfrm>
+            <a:off x="777240" y="4777560"/>
+            <a:ext cx="6217560" cy="4525920"/>
+          </a:xfrm>
+          <a:prstGeom prst="rect">
+            <a:avLst/>
+          </a:prstGeom>
+        </p:spPr>
+        <p:txBody>
+          <a:bodyPr lIns="0" rIns="0" tIns="0" bIns="0">
+            <a:noAutofit/>
+          </a:bodyPr>
+          <a:p>
+            <a:r>
+              <a:rPr b="1" lang="en-US" sz="2000" spc="-1" strike="noStrike">
+                <a:latin typeface="Arial"/>
+              </a:rPr>
+              <a:t>Groups</a:t>
+            </a:r>
+            <a:r>
+              <a:rPr b="0" lang="en-US" sz="2000" spc="-1" strike="noStrike">
+                <a:latin typeface="Arial"/>
+              </a:rPr>
+              <a:t>, just like users, are able to be a part of as many </a:t>
+            </a:r>
+            <a:r>
+              <a:rPr b="1" lang="en-US" sz="2000" spc="-1" strike="noStrike">
+                <a:latin typeface="Arial"/>
+              </a:rPr>
+              <a:t>events</a:t>
+            </a:r>
+            <a:r>
+              <a:rPr b="0" lang="en-US" sz="2000" spc="-1" strike="noStrike">
+                <a:latin typeface="Arial"/>
+              </a:rPr>
+              <a:t> as possible, or none at all.</a:t>
+            </a:r>
+            <a:endParaRPr b="0" lang="en-US" sz="2000" spc="-1" strike="noStrike">
+              <a:latin typeface="Arial"/>
+            </a:endParaRPr>
+          </a:p>
+        </p:txBody>
+      </p:sp>
+    </p:spTree>
+  </p:cSld>
+</p:notes>
+</file>
+
+<file path=ppt/notesSlides/notesSlide5.xml><?xml version="1.0" encoding="utf-8"?>
+<p:notes xmlns:a="http://schemas.openxmlformats.org/drawingml/2006/main" xmlns:p="http://schemas.openxmlformats.org/presentationml/2006/main" xmlns:r="http://schemas.openxmlformats.org/officeDocument/2006/relationships" xmlns:p14="http://schemas.microsoft.com/office/powerpoint/2010/main" xmlns:p15="http://schemas.microsoft.com/office/powerpoint/2012/main" xmlns:mc="http://schemas.openxmlformats.org/markup-compatibility/2006">
+  <p:cSld>
+    <p:spTree>
+      <p:nvGrpSpPr>
+        <p:cNvPr id="1" name=""/>
+        <p:cNvGrpSpPr/>
+        <p:nvPr/>
+      </p:nvGrpSpPr>
+      <p:grpSpPr>
+        <a:xfrm>
+          <a:off x="0" y="0"/>
+          <a:ext cx="0" cy="0"/>
+          <a:chOff x="0" y="0"/>
+          <a:chExt cx="0" cy="0"/>
+        </a:xfrm>
+      </p:grpSpPr>
+      <p:sp>
+        <p:nvSpPr>
+          <p:cNvPr id="73" name="PlaceHolder 1"/>
+          <p:cNvSpPr>
+            <a:spLocks noGrp="1"/>
+          </p:cNvSpPr>
+          <p:nvPr>
+            <p:ph type="sldImg"/>
+          </p:nvPr>
+        </p:nvSpPr>
+        <p:spPr>
+          <a:xfrm>
+            <a:off x="533520" y="764280"/>
+            <a:ext cx="6704640" cy="3771360"/>
+          </a:xfrm>
+          <a:prstGeom prst="rect">
+            <a:avLst/>
+          </a:prstGeom>
+        </p:spPr>
+      </p:sp>
+      <p:sp>
+        <p:nvSpPr>
+          <p:cNvPr id="74" name="PlaceHolder 2"/>
+          <p:cNvSpPr>
+            <a:spLocks noGrp="1"/>
+          </p:cNvSpPr>
+          <p:nvPr>
+            <p:ph type="body"/>
+          </p:nvPr>
+        </p:nvSpPr>
+        <p:spPr>
+          <a:xfrm>
+            <a:off x="777240" y="4777560"/>
+            <a:ext cx="6217560" cy="4525920"/>
+          </a:xfrm>
+          <a:prstGeom prst="rect">
+            <a:avLst/>
+          </a:prstGeom>
+        </p:spPr>
+        <p:txBody>
+          <a:bodyPr lIns="0" rIns="0" tIns="0" bIns="0">
+            <a:noAutofit/>
+          </a:bodyPr>
+          <a:p>
+            <a:r>
+              <a:rPr b="0" lang="en-US" sz="2000" spc="-1" strike="noStrike">
+                <a:latin typeface="Arial"/>
+              </a:rPr>
+              <a:t>And finally, an </a:t>
+            </a:r>
+            <a:r>
+              <a:rPr b="1" lang="en-US" sz="2000" spc="-1" strike="noStrike">
+                <a:latin typeface="Arial"/>
+              </a:rPr>
+              <a:t>event</a:t>
+            </a:r>
+            <a:r>
+              <a:rPr b="0" lang="en-US" sz="2000" spc="-1" strike="noStrike">
+                <a:latin typeface="Arial"/>
+              </a:rPr>
+              <a:t> can only happen once, so it only has one </a:t>
+            </a:r>
+            <a:r>
+              <a:rPr b="1" lang="en-US" sz="2000" spc="-1" strike="noStrike">
+                <a:latin typeface="Arial"/>
+              </a:rPr>
+              <a:t>time</a:t>
+            </a:r>
+            <a:r>
+              <a:rPr b="0" lang="en-US" sz="2000" spc="-1" strike="noStrike">
+                <a:latin typeface="Arial"/>
+              </a:rPr>
+              <a:t>.</a:t>
+            </a:r>
+            <a:endParaRPr b="0" lang="en-US" sz="2000" spc="-1" strike="noStrike">
+              <a:latin typeface="Arial"/>
+            </a:endParaRPr>
+          </a:p>
+        </p:txBody>
+      </p:sp>
+    </p:spTree>
+  </p:cSld>
+</p:notes>
 </file>
 
 <file path=ppt/slideLayouts/slideLayout1.xml><?xml version="1.0" encoding="utf-8"?>
@@ -57,7 +836,7 @@
       </p:grpSpPr>
       <p:sp>
         <p:nvSpPr>
-          <p:cNvPr id="26" name="PlaceHolder 1"/>
+          <p:cNvPr id="23" name="PlaceHolder 1"/>
           <p:cNvSpPr>
             <a:spLocks noGrp="1"/>
           </p:cNvSpPr>
@@ -68,7 +847,7 @@
         <p:spPr>
           <a:xfrm>
             <a:off x="504000" y="226080"/>
-            <a:ext cx="9071640" cy="946440"/>
+            <a:ext cx="9071280" cy="946080"/>
           </a:xfrm>
           <a:prstGeom prst="rect">
             <a:avLst/>
@@ -88,7 +867,7 @@
       </p:sp>
       <p:sp>
         <p:nvSpPr>
-          <p:cNvPr id="27" name="PlaceHolder 2"/>
+          <p:cNvPr id="24" name="PlaceHolder 2"/>
           <p:cNvSpPr>
             <a:spLocks noGrp="1"/>
           </p:cNvSpPr>
@@ -99,7 +878,7 @@
         <p:spPr>
           <a:xfrm>
             <a:off x="504000" y="1326600"/>
-            <a:ext cx="9071640" cy="1568160"/>
+            <a:ext cx="9072000" cy="1568520"/>
           </a:xfrm>
           <a:prstGeom prst="rect">
             <a:avLst/>
@@ -118,7 +897,7 @@
       </p:sp>
       <p:sp>
         <p:nvSpPr>
-          <p:cNvPr id="28" name="PlaceHolder 3"/>
+          <p:cNvPr id="25" name="PlaceHolder 3"/>
           <p:cNvSpPr>
             <a:spLocks noGrp="1"/>
           </p:cNvSpPr>
@@ -128,8 +907,8 @@
         </p:nvSpPr>
         <p:spPr>
           <a:xfrm>
-            <a:off x="504000" y="3044160"/>
-            <a:ext cx="9071640" cy="1568160"/>
+            <a:off x="504000" y="3044520"/>
+            <a:ext cx="9072000" cy="1568520"/>
           </a:xfrm>
           <a:prstGeom prst="rect">
             <a:avLst/>
@@ -170,7 +949,7 @@
       </p:grpSpPr>
       <p:sp>
         <p:nvSpPr>
-          <p:cNvPr id="29" name="PlaceHolder 1"/>
+          <p:cNvPr id="26" name="PlaceHolder 1"/>
           <p:cNvSpPr>
             <a:spLocks noGrp="1"/>
           </p:cNvSpPr>
@@ -181,7 +960,7 @@
         <p:spPr>
           <a:xfrm>
             <a:off x="504000" y="226080"/>
-            <a:ext cx="9071640" cy="946440"/>
+            <a:ext cx="9071280" cy="946080"/>
           </a:xfrm>
           <a:prstGeom prst="rect">
             <a:avLst/>
@@ -201,7 +980,7 @@
       </p:sp>
       <p:sp>
         <p:nvSpPr>
-          <p:cNvPr id="30" name="PlaceHolder 2"/>
+          <p:cNvPr id="27" name="PlaceHolder 2"/>
           <p:cNvSpPr>
             <a:spLocks noGrp="1"/>
           </p:cNvSpPr>
@@ -212,7 +991,7 @@
         <p:spPr>
           <a:xfrm>
             <a:off x="504000" y="1326600"/>
-            <a:ext cx="4426920" cy="1568160"/>
+            <a:ext cx="4426920" cy="1568520"/>
           </a:xfrm>
           <a:prstGeom prst="rect">
             <a:avLst/>
@@ -231,7 +1010,7 @@
       </p:sp>
       <p:sp>
         <p:nvSpPr>
-          <p:cNvPr id="31" name="PlaceHolder 3"/>
+          <p:cNvPr id="28" name="PlaceHolder 3"/>
           <p:cNvSpPr>
             <a:spLocks noGrp="1"/>
           </p:cNvSpPr>
@@ -242,7 +1021,7 @@
         <p:spPr>
           <a:xfrm>
             <a:off x="5152680" y="1326600"/>
-            <a:ext cx="4426920" cy="1568160"/>
+            <a:ext cx="4426920" cy="1568520"/>
           </a:xfrm>
           <a:prstGeom prst="rect">
             <a:avLst/>
@@ -261,7 +1040,7 @@
       </p:sp>
       <p:sp>
         <p:nvSpPr>
-          <p:cNvPr id="32" name="PlaceHolder 4"/>
+          <p:cNvPr id="29" name="PlaceHolder 4"/>
           <p:cNvSpPr>
             <a:spLocks noGrp="1"/>
           </p:cNvSpPr>
@@ -271,8 +1050,8 @@
         </p:nvSpPr>
         <p:spPr>
           <a:xfrm>
-            <a:off x="504000" y="3044160"/>
-            <a:ext cx="4426920" cy="1568160"/>
+            <a:off x="504000" y="3044520"/>
+            <a:ext cx="4426920" cy="1568520"/>
           </a:xfrm>
           <a:prstGeom prst="rect">
             <a:avLst/>
@@ -291,7 +1070,7 @@
       </p:sp>
       <p:sp>
         <p:nvSpPr>
-          <p:cNvPr id="33" name="PlaceHolder 5"/>
+          <p:cNvPr id="30" name="PlaceHolder 5"/>
           <p:cNvSpPr>
             <a:spLocks noGrp="1"/>
           </p:cNvSpPr>
@@ -301,8 +1080,8 @@
         </p:nvSpPr>
         <p:spPr>
           <a:xfrm>
-            <a:off x="5152680" y="3044160"/>
-            <a:ext cx="4426920" cy="1568160"/>
+            <a:off x="5152680" y="3044520"/>
+            <a:ext cx="4426920" cy="1568520"/>
           </a:xfrm>
           <a:prstGeom prst="rect">
             <a:avLst/>
@@ -343,7 +1122,7 @@
       </p:grpSpPr>
       <p:sp>
         <p:nvSpPr>
-          <p:cNvPr id="34" name="PlaceHolder 1"/>
+          <p:cNvPr id="31" name="PlaceHolder 1"/>
           <p:cNvSpPr>
             <a:spLocks noGrp="1"/>
           </p:cNvSpPr>
@@ -354,7 +1133,7 @@
         <p:spPr>
           <a:xfrm>
             <a:off x="504000" y="226080"/>
-            <a:ext cx="9071640" cy="946440"/>
+            <a:ext cx="9071280" cy="946080"/>
           </a:xfrm>
           <a:prstGeom prst="rect">
             <a:avLst/>
@@ -374,7 +1153,7 @@
       </p:sp>
       <p:sp>
         <p:nvSpPr>
-          <p:cNvPr id="35" name="PlaceHolder 2"/>
+          <p:cNvPr id="32" name="PlaceHolder 2"/>
           <p:cNvSpPr>
             <a:spLocks noGrp="1"/>
           </p:cNvSpPr>
@@ -385,7 +1164,7 @@
         <p:spPr>
           <a:xfrm>
             <a:off x="504000" y="1326600"/>
-            <a:ext cx="2920680" cy="1568160"/>
+            <a:ext cx="2921040" cy="1568520"/>
           </a:xfrm>
           <a:prstGeom prst="rect">
             <a:avLst/>
@@ -404,7 +1183,7 @@
       </p:sp>
       <p:sp>
         <p:nvSpPr>
-          <p:cNvPr id="36" name="PlaceHolder 3"/>
+          <p:cNvPr id="33" name="PlaceHolder 3"/>
           <p:cNvSpPr>
             <a:spLocks noGrp="1"/>
           </p:cNvSpPr>
@@ -414,8 +1193,8 @@
         </p:nvSpPr>
         <p:spPr>
           <a:xfrm>
-            <a:off x="3571200" y="1326600"/>
-            <a:ext cx="2920680" cy="1568160"/>
+            <a:off x="3571560" y="1326600"/>
+            <a:ext cx="2921040" cy="1568520"/>
           </a:xfrm>
           <a:prstGeom prst="rect">
             <a:avLst/>
@@ -434,7 +1213,7 @@
       </p:sp>
       <p:sp>
         <p:nvSpPr>
-          <p:cNvPr id="37" name="PlaceHolder 4"/>
+          <p:cNvPr id="34" name="PlaceHolder 4"/>
           <p:cNvSpPr>
             <a:spLocks noGrp="1"/>
           </p:cNvSpPr>
@@ -444,8 +1223,8 @@
         </p:nvSpPr>
         <p:spPr>
           <a:xfrm>
-            <a:off x="6638040" y="1326600"/>
-            <a:ext cx="2920680" cy="1568160"/>
+            <a:off x="6639120" y="1326600"/>
+            <a:ext cx="2921040" cy="1568520"/>
           </a:xfrm>
           <a:prstGeom prst="rect">
             <a:avLst/>
@@ -464,7 +1243,7 @@
       </p:sp>
       <p:sp>
         <p:nvSpPr>
-          <p:cNvPr id="38" name="PlaceHolder 5"/>
+          <p:cNvPr id="35" name="PlaceHolder 5"/>
           <p:cNvSpPr>
             <a:spLocks noGrp="1"/>
           </p:cNvSpPr>
@@ -474,8 +1253,8 @@
         </p:nvSpPr>
         <p:spPr>
           <a:xfrm>
-            <a:off x="504000" y="3044160"/>
-            <a:ext cx="2920680" cy="1568160"/>
+            <a:off x="504000" y="3044520"/>
+            <a:ext cx="2921040" cy="1568520"/>
           </a:xfrm>
           <a:prstGeom prst="rect">
             <a:avLst/>
@@ -494,7 +1273,7 @@
       </p:sp>
       <p:sp>
         <p:nvSpPr>
-          <p:cNvPr id="39" name="PlaceHolder 6"/>
+          <p:cNvPr id="36" name="PlaceHolder 6"/>
           <p:cNvSpPr>
             <a:spLocks noGrp="1"/>
           </p:cNvSpPr>
@@ -504,8 +1283,8 @@
         </p:nvSpPr>
         <p:spPr>
           <a:xfrm>
-            <a:off x="3571200" y="3044160"/>
-            <a:ext cx="2920680" cy="1568160"/>
+            <a:off x="3571560" y="3044520"/>
+            <a:ext cx="2921040" cy="1568520"/>
           </a:xfrm>
           <a:prstGeom prst="rect">
             <a:avLst/>
@@ -524,7 +1303,7 @@
       </p:sp>
       <p:sp>
         <p:nvSpPr>
-          <p:cNvPr id="40" name="PlaceHolder 7"/>
+          <p:cNvPr id="37" name="PlaceHolder 7"/>
           <p:cNvSpPr>
             <a:spLocks noGrp="1"/>
           </p:cNvSpPr>
@@ -534,8 +1313,8 @@
         </p:nvSpPr>
         <p:spPr>
           <a:xfrm>
-            <a:off x="6638040" y="3044160"/>
-            <a:ext cx="2920680" cy="1568160"/>
+            <a:off x="6639120" y="3044520"/>
+            <a:ext cx="2921040" cy="1568520"/>
           </a:xfrm>
           <a:prstGeom prst="rect">
             <a:avLst/>
@@ -576,7 +1355,7 @@
       </p:grpSpPr>
       <p:sp>
         <p:nvSpPr>
-          <p:cNvPr id="5" name="PlaceHolder 1"/>
+          <p:cNvPr id="2" name="PlaceHolder 1"/>
           <p:cNvSpPr>
             <a:spLocks noGrp="1"/>
           </p:cNvSpPr>
@@ -587,7 +1366,7 @@
         <p:spPr>
           <a:xfrm>
             <a:off x="504000" y="226080"/>
-            <a:ext cx="9071640" cy="946440"/>
+            <a:ext cx="9071280" cy="946080"/>
           </a:xfrm>
           <a:prstGeom prst="rect">
             <a:avLst/>
@@ -607,7 +1386,7 @@
       </p:sp>
       <p:sp>
         <p:nvSpPr>
-          <p:cNvPr id="6" name="PlaceHolder 2"/>
+          <p:cNvPr id="3" name="PlaceHolder 2"/>
           <p:cNvSpPr>
             <a:spLocks noGrp="1"/>
           </p:cNvSpPr>
@@ -618,7 +1397,7 @@
         <p:spPr>
           <a:xfrm>
             <a:off x="504000" y="1326600"/>
-            <a:ext cx="9071640" cy="3288240"/>
+            <a:ext cx="9072000" cy="3288600"/>
           </a:xfrm>
           <a:prstGeom prst="rect">
             <a:avLst/>
@@ -660,7 +1439,7 @@
       </p:grpSpPr>
       <p:sp>
         <p:nvSpPr>
-          <p:cNvPr id="7" name="PlaceHolder 1"/>
+          <p:cNvPr id="4" name="PlaceHolder 1"/>
           <p:cNvSpPr>
             <a:spLocks noGrp="1"/>
           </p:cNvSpPr>
@@ -671,7 +1450,7 @@
         <p:spPr>
           <a:xfrm>
             <a:off x="504000" y="226080"/>
-            <a:ext cx="9071640" cy="946440"/>
+            <a:ext cx="9071280" cy="946080"/>
           </a:xfrm>
           <a:prstGeom prst="rect">
             <a:avLst/>
@@ -691,7 +1470,7 @@
       </p:sp>
       <p:sp>
         <p:nvSpPr>
-          <p:cNvPr id="8" name="PlaceHolder 2"/>
+          <p:cNvPr id="5" name="PlaceHolder 2"/>
           <p:cNvSpPr>
             <a:spLocks noGrp="1"/>
           </p:cNvSpPr>
@@ -702,7 +1481,7 @@
         <p:spPr>
           <a:xfrm>
             <a:off x="504000" y="1326600"/>
-            <a:ext cx="9071640" cy="3288240"/>
+            <a:ext cx="9072000" cy="3288600"/>
           </a:xfrm>
           <a:prstGeom prst="rect">
             <a:avLst/>
@@ -743,7 +1522,7 @@
       </p:grpSpPr>
       <p:sp>
         <p:nvSpPr>
-          <p:cNvPr id="9" name="PlaceHolder 1"/>
+          <p:cNvPr id="6" name="PlaceHolder 1"/>
           <p:cNvSpPr>
             <a:spLocks noGrp="1"/>
           </p:cNvSpPr>
@@ -754,7 +1533,7 @@
         <p:spPr>
           <a:xfrm>
             <a:off x="504000" y="226080"/>
-            <a:ext cx="9071640" cy="946440"/>
+            <a:ext cx="9071280" cy="946080"/>
           </a:xfrm>
           <a:prstGeom prst="rect">
             <a:avLst/>
@@ -774,7 +1553,7 @@
       </p:sp>
       <p:sp>
         <p:nvSpPr>
-          <p:cNvPr id="10" name="PlaceHolder 2"/>
+          <p:cNvPr id="7" name="PlaceHolder 2"/>
           <p:cNvSpPr>
             <a:spLocks noGrp="1"/>
           </p:cNvSpPr>
@@ -785,7 +1564,7 @@
         <p:spPr>
           <a:xfrm>
             <a:off x="504000" y="1326600"/>
-            <a:ext cx="4426920" cy="3288240"/>
+            <a:ext cx="4426920" cy="3288600"/>
           </a:xfrm>
           <a:prstGeom prst="rect">
             <a:avLst/>
@@ -804,7 +1583,7 @@
       </p:sp>
       <p:sp>
         <p:nvSpPr>
-          <p:cNvPr id="11" name="PlaceHolder 3"/>
+          <p:cNvPr id="8" name="PlaceHolder 3"/>
           <p:cNvSpPr>
             <a:spLocks noGrp="1"/>
           </p:cNvSpPr>
@@ -815,7 +1594,7 @@
         <p:spPr>
           <a:xfrm>
             <a:off x="5152680" y="1326600"/>
-            <a:ext cx="4426920" cy="3288240"/>
+            <a:ext cx="4426920" cy="3288600"/>
           </a:xfrm>
           <a:prstGeom prst="rect">
             <a:avLst/>
@@ -856,7 +1635,7 @@
       </p:grpSpPr>
       <p:sp>
         <p:nvSpPr>
-          <p:cNvPr id="12" name="PlaceHolder 1"/>
+          <p:cNvPr id="9" name="PlaceHolder 1"/>
           <p:cNvSpPr>
             <a:spLocks noGrp="1"/>
           </p:cNvSpPr>
@@ -867,7 +1646,7 @@
         <p:spPr>
           <a:xfrm>
             <a:off x="504000" y="226080"/>
-            <a:ext cx="9071640" cy="946440"/>
+            <a:ext cx="9071280" cy="946080"/>
           </a:xfrm>
           <a:prstGeom prst="rect">
             <a:avLst/>
@@ -909,7 +1688,7 @@
       </p:grpSpPr>
       <p:sp>
         <p:nvSpPr>
-          <p:cNvPr id="13" name="PlaceHolder 1"/>
+          <p:cNvPr id="10" name="PlaceHolder 1"/>
           <p:cNvSpPr>
             <a:spLocks noGrp="1"/>
           </p:cNvSpPr>
@@ -920,7 +1699,7 @@
         <p:spPr>
           <a:xfrm>
             <a:off x="504000" y="226080"/>
-            <a:ext cx="9071640" cy="4388400"/>
+            <a:ext cx="9071280" cy="4386600"/>
           </a:xfrm>
           <a:prstGeom prst="rect">
             <a:avLst/>
@@ -962,7 +1741,7 @@
       </p:grpSpPr>
       <p:sp>
         <p:nvSpPr>
-          <p:cNvPr id="14" name="PlaceHolder 1"/>
+          <p:cNvPr id="11" name="PlaceHolder 1"/>
           <p:cNvSpPr>
             <a:spLocks noGrp="1"/>
           </p:cNvSpPr>
@@ -973,7 +1752,7 @@
         <p:spPr>
           <a:xfrm>
             <a:off x="504000" y="226080"/>
-            <a:ext cx="9071640" cy="946440"/>
+            <a:ext cx="9071280" cy="946080"/>
           </a:xfrm>
           <a:prstGeom prst="rect">
             <a:avLst/>
@@ -993,7 +1772,7 @@
       </p:sp>
       <p:sp>
         <p:nvSpPr>
-          <p:cNvPr id="15" name="PlaceHolder 2"/>
+          <p:cNvPr id="12" name="PlaceHolder 2"/>
           <p:cNvSpPr>
             <a:spLocks noGrp="1"/>
           </p:cNvSpPr>
@@ -1004,7 +1783,7 @@
         <p:spPr>
           <a:xfrm>
             <a:off x="504000" y="1326600"/>
-            <a:ext cx="4426920" cy="1568160"/>
+            <a:ext cx="4426920" cy="1568520"/>
           </a:xfrm>
           <a:prstGeom prst="rect">
             <a:avLst/>
@@ -1023,7 +1802,7 @@
       </p:sp>
       <p:sp>
         <p:nvSpPr>
-          <p:cNvPr id="16" name="PlaceHolder 3"/>
+          <p:cNvPr id="13" name="PlaceHolder 3"/>
           <p:cNvSpPr>
             <a:spLocks noGrp="1"/>
           </p:cNvSpPr>
@@ -1034,7 +1813,7 @@
         <p:spPr>
           <a:xfrm>
             <a:off x="5152680" y="1326600"/>
-            <a:ext cx="4426920" cy="3288240"/>
+            <a:ext cx="4426920" cy="3288600"/>
           </a:xfrm>
           <a:prstGeom prst="rect">
             <a:avLst/>
@@ -1053,7 +1832,7 @@
       </p:sp>
       <p:sp>
         <p:nvSpPr>
-          <p:cNvPr id="17" name="PlaceHolder 4"/>
+          <p:cNvPr id="14" name="PlaceHolder 4"/>
           <p:cNvSpPr>
             <a:spLocks noGrp="1"/>
           </p:cNvSpPr>
@@ -1063,8 +1842,8 @@
         </p:nvSpPr>
         <p:spPr>
           <a:xfrm>
-            <a:off x="504000" y="3044160"/>
-            <a:ext cx="4426920" cy="1568160"/>
+            <a:off x="504000" y="3044520"/>
+            <a:ext cx="4426920" cy="1568520"/>
           </a:xfrm>
           <a:prstGeom prst="rect">
             <a:avLst/>
@@ -1105,7 +1884,7 @@
       </p:grpSpPr>
       <p:sp>
         <p:nvSpPr>
-          <p:cNvPr id="18" name="PlaceHolder 1"/>
+          <p:cNvPr id="15" name="PlaceHolder 1"/>
           <p:cNvSpPr>
             <a:spLocks noGrp="1"/>
           </p:cNvSpPr>
@@ -1116,7 +1895,7 @@
         <p:spPr>
           <a:xfrm>
             <a:off x="504000" y="226080"/>
-            <a:ext cx="9071640" cy="946440"/>
+            <a:ext cx="9071280" cy="946080"/>
           </a:xfrm>
           <a:prstGeom prst="rect">
             <a:avLst/>
@@ -1136,7 +1915,7 @@
       </p:sp>
       <p:sp>
         <p:nvSpPr>
-          <p:cNvPr id="19" name="PlaceHolder 2"/>
+          <p:cNvPr id="16" name="PlaceHolder 2"/>
           <p:cNvSpPr>
             <a:spLocks noGrp="1"/>
           </p:cNvSpPr>
@@ -1147,7 +1926,7 @@
         <p:spPr>
           <a:xfrm>
             <a:off x="504000" y="1326600"/>
-            <a:ext cx="4426920" cy="3288240"/>
+            <a:ext cx="4426920" cy="3288600"/>
           </a:xfrm>
           <a:prstGeom prst="rect">
             <a:avLst/>
@@ -1166,7 +1945,7 @@
       </p:sp>
       <p:sp>
         <p:nvSpPr>
-          <p:cNvPr id="20" name="PlaceHolder 3"/>
+          <p:cNvPr id="17" name="PlaceHolder 3"/>
           <p:cNvSpPr>
             <a:spLocks noGrp="1"/>
           </p:cNvSpPr>
@@ -1177,7 +1956,7 @@
         <p:spPr>
           <a:xfrm>
             <a:off x="5152680" y="1326600"/>
-            <a:ext cx="4426920" cy="1568160"/>
+            <a:ext cx="4426920" cy="1568520"/>
           </a:xfrm>
           <a:prstGeom prst="rect">
             <a:avLst/>
@@ -1196,7 +1975,7 @@
       </p:sp>
       <p:sp>
         <p:nvSpPr>
-          <p:cNvPr id="21" name="PlaceHolder 4"/>
+          <p:cNvPr id="18" name="PlaceHolder 4"/>
           <p:cNvSpPr>
             <a:spLocks noGrp="1"/>
           </p:cNvSpPr>
@@ -1206,8 +1985,8 @@
         </p:nvSpPr>
         <p:spPr>
           <a:xfrm>
-            <a:off x="5152680" y="3044160"/>
-            <a:ext cx="4426920" cy="1568160"/>
+            <a:off x="5152680" y="3044520"/>
+            <a:ext cx="4426920" cy="1568520"/>
           </a:xfrm>
           <a:prstGeom prst="rect">
             <a:avLst/>
@@ -1248,7 +2027,7 @@
       </p:grpSpPr>
       <p:sp>
         <p:nvSpPr>
-          <p:cNvPr id="22" name="PlaceHolder 1"/>
+          <p:cNvPr id="19" name="PlaceHolder 1"/>
           <p:cNvSpPr>
             <a:spLocks noGrp="1"/>
           </p:cNvSpPr>
@@ -1259,7 +2038,7 @@
         <p:spPr>
           <a:xfrm>
             <a:off x="504000" y="226080"/>
-            <a:ext cx="9071640" cy="946440"/>
+            <a:ext cx="9071280" cy="946080"/>
           </a:xfrm>
           <a:prstGeom prst="rect">
             <a:avLst/>
@@ -1279,7 +2058,7 @@
       </p:sp>
       <p:sp>
         <p:nvSpPr>
-          <p:cNvPr id="23" name="PlaceHolder 2"/>
+          <p:cNvPr id="20" name="PlaceHolder 2"/>
           <p:cNvSpPr>
             <a:spLocks noGrp="1"/>
           </p:cNvSpPr>
@@ -1290,7 +2069,7 @@
         <p:spPr>
           <a:xfrm>
             <a:off x="504000" y="1326600"/>
-            <a:ext cx="4426920" cy="1568160"/>
+            <a:ext cx="4426920" cy="1568520"/>
           </a:xfrm>
           <a:prstGeom prst="rect">
             <a:avLst/>
@@ -1309,7 +2088,7 @@
       </p:sp>
       <p:sp>
         <p:nvSpPr>
-          <p:cNvPr id="24" name="PlaceHolder 3"/>
+          <p:cNvPr id="21" name="PlaceHolder 3"/>
           <p:cNvSpPr>
             <a:spLocks noGrp="1"/>
           </p:cNvSpPr>
@@ -1320,7 +2099,7 @@
         <p:spPr>
           <a:xfrm>
             <a:off x="5152680" y="1326600"/>
-            <a:ext cx="4426920" cy="1568160"/>
+            <a:ext cx="4426920" cy="1568520"/>
           </a:xfrm>
           <a:prstGeom prst="rect">
             <a:avLst/>
@@ -1339,7 +2118,7 @@
       </p:sp>
       <p:sp>
         <p:nvSpPr>
-          <p:cNvPr id="25" name="PlaceHolder 4"/>
+          <p:cNvPr id="22" name="PlaceHolder 4"/>
           <p:cNvSpPr>
             <a:spLocks noGrp="1"/>
           </p:cNvSpPr>
@@ -1349,8 +2128,8 @@
         </p:nvSpPr>
         <p:spPr>
           <a:xfrm>
-            <a:off x="504000" y="3044160"/>
-            <a:ext cx="9071640" cy="1568160"/>
+            <a:off x="504000" y="3044520"/>
+            <a:ext cx="9072000" cy="1568520"/>
           </a:xfrm>
           <a:prstGeom prst="rect">
             <a:avLst/>
@@ -1402,7 +2181,7 @@
         <p:spPr>
           <a:xfrm>
             <a:off x="504000" y="226080"/>
-            <a:ext cx="9071640" cy="946440"/>
+            <a:ext cx="9071280" cy="946080"/>
           </a:xfrm>
           <a:prstGeom prst="rect">
             <a:avLst/>
@@ -1415,198 +2194,12 @@
           <a:p>
             <a:pPr algn="ctr"/>
             <a:r>
-              <a:rPr b="0" lang="en-US" sz="4400" spc="-1" strike="noStrike">
-                <a:latin typeface="Arial"/>
-              </a:rPr>
-              <a:t>C</a:t>
-            </a:r>
-            <a:r>
-              <a:rPr b="0" lang="en-US" sz="4400" spc="-1" strike="noStrike">
-                <a:latin typeface="Arial"/>
-              </a:rPr>
-              <a:t>li</a:t>
-            </a:r>
-            <a:r>
-              <a:rPr b="0" lang="en-US" sz="4400" spc="-1" strike="noStrike">
-                <a:latin typeface="Arial"/>
-              </a:rPr>
-              <a:t>c</a:t>
-            </a:r>
-            <a:r>
-              <a:rPr b="0" lang="en-US" sz="4400" spc="-1" strike="noStrike">
-                <a:latin typeface="Arial"/>
-              </a:rPr>
-              <a:t>k</a:t>
-            </a:r>
-            <a:r>
-              <a:rPr b="0" lang="en-US" sz="4400" spc="-1" strike="noStrike">
-                <a:latin typeface="Arial"/>
-              </a:rPr>
-              <a:t> </a:t>
-            </a:r>
-            <a:r>
-              <a:rPr b="0" lang="en-US" sz="4400" spc="-1" strike="noStrike">
-                <a:latin typeface="Arial"/>
-              </a:rPr>
-              <a:t>t</a:t>
-            </a:r>
-            <a:r>
-              <a:rPr b="0" lang="en-US" sz="4400" spc="-1" strike="noStrike">
-                <a:latin typeface="Arial"/>
-              </a:rPr>
-              <a:t>o</a:t>
-            </a:r>
-            <a:r>
-              <a:rPr b="0" lang="en-US" sz="4400" spc="-1" strike="noStrike">
-                <a:latin typeface="Arial"/>
-              </a:rPr>
-              <a:t> </a:t>
-            </a:r>
-            <a:r>
-              <a:rPr b="0" lang="en-US" sz="4400" spc="-1" strike="noStrike">
-                <a:latin typeface="Arial"/>
-              </a:rPr>
-              <a:t>e</a:t>
-            </a:r>
-            <a:r>
-              <a:rPr b="0" lang="en-US" sz="4400" spc="-1" strike="noStrike">
-                <a:latin typeface="Arial"/>
-              </a:rPr>
-              <a:t>d</a:t>
-            </a:r>
-            <a:r>
-              <a:rPr b="0" lang="en-US" sz="4400" spc="-1" strike="noStrike">
-                <a:latin typeface="Arial"/>
-              </a:rPr>
-              <a:t>i</a:t>
-            </a:r>
-            <a:r>
-              <a:rPr b="0" lang="en-US" sz="4400" spc="-1" strike="noStrike">
-                <a:latin typeface="Arial"/>
-              </a:rPr>
-              <a:t>t </a:t>
-            </a:r>
-            <a:r>
-              <a:rPr b="0" lang="en-US" sz="4400" spc="-1" strike="noStrike">
-                <a:latin typeface="Arial"/>
-              </a:rPr>
-              <a:t>t</a:t>
-            </a:r>
-            <a:r>
-              <a:rPr b="0" lang="en-US" sz="4400" spc="-1" strike="noStrike">
-                <a:latin typeface="Arial"/>
-              </a:rPr>
-              <a:t>h</a:t>
-            </a:r>
-            <a:r>
-              <a:rPr b="0" lang="en-US" sz="4400" spc="-1" strike="noStrike">
-                <a:latin typeface="Arial"/>
-              </a:rPr>
-              <a:t>e</a:t>
-            </a:r>
-            <a:r>
-              <a:rPr b="0" lang="en-US" sz="4400" spc="-1" strike="noStrike">
-                <a:latin typeface="Arial"/>
-              </a:rPr>
-              <a:t> </a:t>
-            </a:r>
-            <a:r>
-              <a:rPr b="0" lang="en-US" sz="4400" spc="-1" strike="noStrike">
-                <a:latin typeface="Arial"/>
-              </a:rPr>
-              <a:t>t</a:t>
-            </a:r>
-            <a:r>
-              <a:rPr b="0" lang="en-US" sz="4400" spc="-1" strike="noStrike">
-                <a:latin typeface="Arial"/>
-              </a:rPr>
-              <a:t>i</a:t>
-            </a:r>
-            <a:r>
-              <a:rPr b="0" lang="en-US" sz="4400" spc="-1" strike="noStrike">
-                <a:latin typeface="Arial"/>
-              </a:rPr>
-              <a:t>t</a:t>
-            </a:r>
-            <a:r>
-              <a:rPr b="0" lang="en-US" sz="4400" spc="-1" strike="noStrike">
-                <a:latin typeface="Arial"/>
-              </a:rPr>
-              <a:t>l</a:t>
-            </a:r>
-            <a:r>
-              <a:rPr b="0" lang="en-US" sz="4400" spc="-1" strike="noStrike">
-                <a:latin typeface="Arial"/>
-              </a:rPr>
-              <a:t>e</a:t>
-            </a:r>
-            <a:r>
-              <a:rPr b="0" lang="en-US" sz="4400" spc="-1" strike="noStrike">
-                <a:latin typeface="Arial"/>
-              </a:rPr>
-              <a:t> </a:t>
-            </a:r>
-            <a:r>
-              <a:rPr b="0" lang="en-US" sz="4400" spc="-1" strike="noStrike">
-                <a:latin typeface="Arial"/>
-              </a:rPr>
-              <a:t>t</a:t>
-            </a:r>
-            <a:r>
-              <a:rPr b="0" lang="en-US" sz="4400" spc="-1" strike="noStrike">
-                <a:latin typeface="Arial"/>
-              </a:rPr>
-              <a:t>e</a:t>
-            </a:r>
-            <a:r>
-              <a:rPr b="0" lang="en-US" sz="4400" spc="-1" strike="noStrike">
-                <a:latin typeface="Arial"/>
-              </a:rPr>
-              <a:t>x</a:t>
-            </a:r>
-            <a:r>
-              <a:rPr b="0" lang="en-US" sz="4400" spc="-1" strike="noStrike">
-                <a:latin typeface="Arial"/>
-              </a:rPr>
-              <a:t>t </a:t>
-            </a:r>
-            <a:r>
-              <a:rPr b="0" lang="en-US" sz="4400" spc="-1" strike="noStrike">
-                <a:latin typeface="Arial"/>
-              </a:rPr>
-              <a:t>f</a:t>
-            </a:r>
-            <a:r>
-              <a:rPr b="0" lang="en-US" sz="4400" spc="-1" strike="noStrike">
-                <a:latin typeface="Arial"/>
-              </a:rPr>
-              <a:t>o</a:t>
-            </a:r>
-            <a:r>
-              <a:rPr b="0" lang="en-US" sz="4400" spc="-1" strike="noStrike">
-                <a:latin typeface="Arial"/>
-              </a:rPr>
-              <a:t>r</a:t>
-            </a:r>
-            <a:r>
-              <a:rPr b="0" lang="en-US" sz="4400" spc="-1" strike="noStrike">
-                <a:latin typeface="Arial"/>
-              </a:rPr>
-              <a:t>m</a:t>
-            </a:r>
-            <a:r>
-              <a:rPr b="0" lang="en-US" sz="4400" spc="-1" strike="noStrike">
-                <a:latin typeface="Arial"/>
-              </a:rPr>
-              <a:t>a</a:t>
-            </a:r>
-            <a:r>
-              <a:rPr b="0" lang="en-US" sz="4400" spc="-1" strike="noStrike">
-                <a:latin typeface="Arial"/>
-              </a:rPr>
-              <a:t>t</a:t>
-            </a:r>
-            <a:endParaRPr b="0" lang="en-US" sz="4400" spc="-1" strike="noStrike">
+              <a:rPr b="0" lang="en-US" sz="1800" spc="-1" strike="noStrike">
+                <a:latin typeface="Arial"/>
+              </a:rPr>
+              <a:t>Click to edit the title text format</a:t>
+            </a:r>
+            <a:endParaRPr b="0" lang="en-US" sz="1800" spc="-1" strike="noStrike">
               <a:latin typeface="Arial"/>
             </a:endParaRPr>
           </a:p>
@@ -1625,7 +2218,7 @@
         <p:spPr>
           <a:xfrm>
             <a:off x="504000" y="1326600"/>
-            <a:ext cx="9071640" cy="3288240"/>
+            <a:ext cx="9072000" cy="3288600"/>
           </a:xfrm>
           <a:prstGeom prst="rect">
             <a:avLst/>
@@ -1787,116 +2380,6 @@
             </a:r>
             <a:endParaRPr b="0" lang="en-US" sz="2000" spc="-1" strike="noStrike">
               <a:latin typeface="Arial"/>
-            </a:endParaRPr>
-          </a:p>
-        </p:txBody>
-      </p:sp>
-      <p:sp>
-        <p:nvSpPr>
-          <p:cNvPr id="2" name="PlaceHolder 3"/>
-          <p:cNvSpPr>
-            <a:spLocks noGrp="1"/>
-          </p:cNvSpPr>
-          <p:nvPr>
-            <p:ph type="dt"/>
-          </p:nvPr>
-        </p:nvSpPr>
-        <p:spPr>
-          <a:xfrm>
-            <a:off x="504000" y="5165280"/>
-            <a:ext cx="2348280" cy="390600"/>
-          </a:xfrm>
-          <a:prstGeom prst="rect">
-            <a:avLst/>
-          </a:prstGeom>
-        </p:spPr>
-        <p:txBody>
-          <a:bodyPr lIns="0" rIns="0" tIns="0" bIns="0">
-            <a:noAutofit/>
-          </a:bodyPr>
-          <a:p>
-            <a:r>
-              <a:rPr b="0" lang="en-US" sz="1400" spc="-1" strike="noStrike">
-                <a:latin typeface="Times New Roman"/>
-              </a:rPr>
-              <a:t>&lt;date/time&gt;</a:t>
-            </a:r>
-            <a:endParaRPr b="0" lang="en-US" sz="1400" spc="-1" strike="noStrike">
-              <a:latin typeface="Times New Roman"/>
-            </a:endParaRPr>
-          </a:p>
-        </p:txBody>
-      </p:sp>
-      <p:sp>
-        <p:nvSpPr>
-          <p:cNvPr id="3" name="PlaceHolder 4"/>
-          <p:cNvSpPr>
-            <a:spLocks noGrp="1"/>
-          </p:cNvSpPr>
-          <p:nvPr>
-            <p:ph type="ftr"/>
-          </p:nvPr>
-        </p:nvSpPr>
-        <p:spPr>
-          <a:xfrm>
-            <a:off x="3447360" y="5165280"/>
-            <a:ext cx="3195000" cy="390600"/>
-          </a:xfrm>
-          <a:prstGeom prst="rect">
-            <a:avLst/>
-          </a:prstGeom>
-        </p:spPr>
-        <p:txBody>
-          <a:bodyPr lIns="0" rIns="0" tIns="0" bIns="0">
-            <a:noAutofit/>
-          </a:bodyPr>
-          <a:p>
-            <a:pPr algn="ctr"/>
-            <a:r>
-              <a:rPr b="0" lang="en-US" sz="1400" spc="-1" strike="noStrike">
-                <a:latin typeface="Times New Roman"/>
-              </a:rPr>
-              <a:t>&lt;footer&gt;</a:t>
-            </a:r>
-            <a:endParaRPr b="0" lang="en-US" sz="1400" spc="-1" strike="noStrike">
-              <a:latin typeface="Times New Roman"/>
-            </a:endParaRPr>
-          </a:p>
-        </p:txBody>
-      </p:sp>
-      <p:sp>
-        <p:nvSpPr>
-          <p:cNvPr id="4" name="PlaceHolder 5"/>
-          <p:cNvSpPr>
-            <a:spLocks noGrp="1"/>
-          </p:cNvSpPr>
-          <p:nvPr>
-            <p:ph type="sldNum"/>
-          </p:nvPr>
-        </p:nvSpPr>
-        <p:spPr>
-          <a:xfrm>
-            <a:off x="7227360" y="5165280"/>
-            <a:ext cx="2348280" cy="390600"/>
-          </a:xfrm>
-          <a:prstGeom prst="rect">
-            <a:avLst/>
-          </a:prstGeom>
-        </p:spPr>
-        <p:txBody>
-          <a:bodyPr lIns="0" rIns="0" tIns="0" bIns="0">
-            <a:noAutofit/>
-          </a:bodyPr>
-          <a:p>
-            <a:pPr algn="r"/>
-            <a:fld id="{2A753991-3C0E-43F5-95BD-3346EF23CFCA}" type="slidenum">
-              <a:rPr b="0" lang="en-US" sz="1400" spc="-1" strike="noStrike">
-                <a:latin typeface="Times New Roman"/>
-              </a:rPr>
-              <a:t>&lt;number&gt;</a:t>
-            </a:fld>
-            <a:endParaRPr b="0" lang="en-US" sz="1400" spc="-1" strike="noStrike">
-              <a:latin typeface="Times New Roman"/>
             </a:endParaRPr>
           </a:p>
         </p:txBody>
@@ -1940,7 +2423,7 @@
       </p:grpSpPr>
       <p:pic>
         <p:nvPicPr>
-          <p:cNvPr id="41" name="" descr=""/>
+          <p:cNvPr id="44" name="" descr=""/>
           <p:cNvPicPr/>
           <p:nvPr/>
         </p:nvPicPr>
@@ -1951,7 +2434,7 @@
         <p:spPr>
           <a:xfrm>
             <a:off x="810360" y="687600"/>
-            <a:ext cx="8457840" cy="4295520"/>
+            <a:ext cx="8457480" cy="4295160"/>
           </a:xfrm>
           <a:prstGeom prst="rect">
             <a:avLst/>
@@ -1963,14 +2446,14 @@
       </p:pic>
       <p:sp>
         <p:nvSpPr>
-          <p:cNvPr id="42" name="CustomShape 1"/>
+          <p:cNvPr id="45" name="CustomShape 1"/>
           <p:cNvSpPr/>
           <p:nvPr/>
         </p:nvSpPr>
         <p:spPr>
           <a:xfrm>
             <a:off x="3749040" y="822960"/>
-            <a:ext cx="640080" cy="552240"/>
+            <a:ext cx="639720" cy="551880"/>
           </a:xfrm>
           <a:prstGeom prst="donut">
             <a:avLst>
@@ -1995,14 +2478,14 @@
       </p:sp>
       <p:sp>
         <p:nvSpPr>
-          <p:cNvPr id="43" name="CustomShape 2"/>
+          <p:cNvPr id="46" name="CustomShape 2"/>
           <p:cNvSpPr/>
           <p:nvPr/>
         </p:nvSpPr>
         <p:spPr>
           <a:xfrm>
             <a:off x="1337400" y="2731320"/>
-            <a:ext cx="640080" cy="552240"/>
+            <a:ext cx="639720" cy="551880"/>
           </a:xfrm>
           <a:prstGeom prst="donut">
             <a:avLst>
@@ -2057,7 +2540,7 @@
       </p:grpSpPr>
       <p:pic>
         <p:nvPicPr>
-          <p:cNvPr id="44" name="" descr=""/>
+          <p:cNvPr id="47" name="" descr=""/>
           <p:cNvPicPr/>
           <p:nvPr/>
         </p:nvPicPr>
@@ -2068,7 +2551,7 @@
         <p:spPr>
           <a:xfrm>
             <a:off x="821520" y="687600"/>
-            <a:ext cx="8457840" cy="4295520"/>
+            <a:ext cx="8457480" cy="4295160"/>
           </a:xfrm>
           <a:prstGeom prst="rect">
             <a:avLst/>
@@ -2080,14 +2563,14 @@
       </p:pic>
       <p:sp>
         <p:nvSpPr>
-          <p:cNvPr id="45" name="CustomShape 1"/>
+          <p:cNvPr id="48" name="CustomShape 1"/>
           <p:cNvSpPr/>
           <p:nvPr/>
         </p:nvSpPr>
         <p:spPr>
           <a:xfrm>
             <a:off x="2468880" y="3013920"/>
-            <a:ext cx="640080" cy="552240"/>
+            <a:ext cx="639720" cy="551880"/>
           </a:xfrm>
           <a:prstGeom prst="donut">
             <a:avLst>
@@ -2112,14 +2595,14 @@
       </p:sp>
       <p:sp>
         <p:nvSpPr>
-          <p:cNvPr id="46" name="CustomShape 2"/>
+          <p:cNvPr id="49" name="CustomShape 2"/>
           <p:cNvSpPr/>
           <p:nvPr/>
         </p:nvSpPr>
         <p:spPr>
           <a:xfrm>
             <a:off x="3840480" y="3034080"/>
-            <a:ext cx="640080" cy="552240"/>
+            <a:ext cx="639720" cy="551880"/>
           </a:xfrm>
           <a:prstGeom prst="donut">
             <a:avLst>
@@ -2144,14 +2627,14 @@
       </p:sp>
       <p:sp>
         <p:nvSpPr>
-          <p:cNvPr id="47" name="CustomShape 3"/>
+          <p:cNvPr id="50" name="CustomShape 3"/>
           <p:cNvSpPr/>
           <p:nvPr/>
         </p:nvSpPr>
         <p:spPr>
           <a:xfrm>
             <a:off x="1353240" y="2726280"/>
-            <a:ext cx="640080" cy="552240"/>
+            <a:ext cx="639720" cy="551880"/>
           </a:xfrm>
           <a:prstGeom prst="donut">
             <a:avLst>
@@ -2176,14 +2659,14 @@
       </p:sp>
       <p:sp>
         <p:nvSpPr>
-          <p:cNvPr id="48" name="CustomShape 4"/>
+          <p:cNvPr id="51" name="CustomShape 4"/>
           <p:cNvSpPr/>
           <p:nvPr/>
         </p:nvSpPr>
         <p:spPr>
           <a:xfrm>
             <a:off x="4845600" y="2762640"/>
-            <a:ext cx="640080" cy="473760"/>
+            <a:ext cx="639720" cy="473400"/>
           </a:xfrm>
           <a:prstGeom prst="donut">
             <a:avLst>
@@ -2238,7 +2721,7 @@
       </p:grpSpPr>
       <p:pic>
         <p:nvPicPr>
-          <p:cNvPr id="49" name="" descr=""/>
+          <p:cNvPr id="52" name="" descr=""/>
           <p:cNvPicPr/>
           <p:nvPr/>
         </p:nvPicPr>
@@ -2249,7 +2732,7 @@
         <p:spPr>
           <a:xfrm>
             <a:off x="821520" y="687600"/>
-            <a:ext cx="8457840" cy="4295520"/>
+            <a:ext cx="8457480" cy="4295160"/>
           </a:xfrm>
           <a:prstGeom prst="rect">
             <a:avLst/>
@@ -2261,14 +2744,14 @@
       </p:pic>
       <p:sp>
         <p:nvSpPr>
-          <p:cNvPr id="50" name="CustomShape 1"/>
+          <p:cNvPr id="53" name="CustomShape 1"/>
           <p:cNvSpPr/>
           <p:nvPr/>
         </p:nvSpPr>
         <p:spPr>
           <a:xfrm>
             <a:off x="7223760" y="4294080"/>
-            <a:ext cx="640080" cy="552240"/>
+            <a:ext cx="639720" cy="551880"/>
           </a:xfrm>
           <a:prstGeom prst="donut">
             <a:avLst>
@@ -2293,14 +2776,14 @@
       </p:sp>
       <p:sp>
         <p:nvSpPr>
-          <p:cNvPr id="51" name="CustomShape 2"/>
+          <p:cNvPr id="54" name="CustomShape 2"/>
           <p:cNvSpPr/>
           <p:nvPr/>
         </p:nvSpPr>
         <p:spPr>
           <a:xfrm>
             <a:off x="1920240" y="4297680"/>
-            <a:ext cx="640080" cy="552240"/>
+            <a:ext cx="639720" cy="551880"/>
           </a:xfrm>
           <a:prstGeom prst="donut">
             <a:avLst>
@@ -2325,14 +2808,14 @@
       </p:sp>
       <p:sp>
         <p:nvSpPr>
-          <p:cNvPr id="52" name="CustomShape 3"/>
+          <p:cNvPr id="55" name="CustomShape 3"/>
           <p:cNvSpPr/>
           <p:nvPr/>
         </p:nvSpPr>
         <p:spPr>
           <a:xfrm>
             <a:off x="1344600" y="2714040"/>
-            <a:ext cx="640080" cy="552240"/>
+            <a:ext cx="639720" cy="551880"/>
           </a:xfrm>
           <a:prstGeom prst="donut">
             <a:avLst>
@@ -2357,14 +2840,14 @@
       </p:sp>
       <p:sp>
         <p:nvSpPr>
-          <p:cNvPr id="53" name="CustomShape 4"/>
+          <p:cNvPr id="56" name="CustomShape 4"/>
           <p:cNvSpPr/>
           <p:nvPr/>
         </p:nvSpPr>
         <p:spPr>
           <a:xfrm>
             <a:off x="8076960" y="2714400"/>
-            <a:ext cx="640080" cy="552240"/>
+            <a:ext cx="639720" cy="551880"/>
           </a:xfrm>
           <a:prstGeom prst="donut">
             <a:avLst>
@@ -2419,7 +2902,7 @@
       </p:grpSpPr>
       <p:pic>
         <p:nvPicPr>
-          <p:cNvPr id="54" name="" descr=""/>
+          <p:cNvPr id="57" name="" descr=""/>
           <p:cNvPicPr/>
           <p:nvPr/>
         </p:nvPicPr>
@@ -2430,7 +2913,7 @@
         <p:spPr>
           <a:xfrm>
             <a:off x="821520" y="687600"/>
-            <a:ext cx="8457840" cy="4295520"/>
+            <a:ext cx="8457480" cy="4295160"/>
           </a:xfrm>
           <a:prstGeom prst="rect">
             <a:avLst/>
@@ -2442,14 +2925,14 @@
       </p:pic>
       <p:sp>
         <p:nvSpPr>
-          <p:cNvPr id="55" name="CustomShape 1"/>
+          <p:cNvPr id="58" name="CustomShape 1"/>
           <p:cNvSpPr/>
           <p:nvPr/>
         </p:nvSpPr>
         <p:spPr>
           <a:xfrm>
             <a:off x="6881400" y="3019320"/>
-            <a:ext cx="640080" cy="552240"/>
+            <a:ext cx="639720" cy="551880"/>
           </a:xfrm>
           <a:prstGeom prst="donut">
             <a:avLst>
@@ -2474,14 +2957,14 @@
       </p:sp>
       <p:sp>
         <p:nvSpPr>
-          <p:cNvPr id="56" name="CustomShape 2"/>
+          <p:cNvPr id="59" name="CustomShape 2"/>
           <p:cNvSpPr/>
           <p:nvPr/>
         </p:nvSpPr>
         <p:spPr>
           <a:xfrm>
             <a:off x="5873400" y="3019320"/>
-            <a:ext cx="640080" cy="552240"/>
+            <a:ext cx="639720" cy="551880"/>
           </a:xfrm>
           <a:prstGeom prst="donut">
             <a:avLst>
@@ -2506,14 +2989,14 @@
       </p:sp>
       <p:sp>
         <p:nvSpPr>
-          <p:cNvPr id="57" name="CustomShape 3"/>
+          <p:cNvPr id="60" name="CustomShape 3"/>
           <p:cNvSpPr/>
           <p:nvPr/>
         </p:nvSpPr>
         <p:spPr>
           <a:xfrm>
             <a:off x="4872960" y="2714400"/>
-            <a:ext cx="640080" cy="552240"/>
+            <a:ext cx="639720" cy="551880"/>
           </a:xfrm>
           <a:prstGeom prst="donut">
             <a:avLst>
@@ -2538,14 +3021,14 @@
       </p:sp>
       <p:sp>
         <p:nvSpPr>
-          <p:cNvPr id="58" name="CustomShape 4"/>
+          <p:cNvPr id="61" name="CustomShape 4"/>
           <p:cNvSpPr/>
           <p:nvPr/>
         </p:nvSpPr>
         <p:spPr>
           <a:xfrm>
             <a:off x="8077320" y="2714760"/>
-            <a:ext cx="640080" cy="552240"/>
+            <a:ext cx="639720" cy="551880"/>
           </a:xfrm>
           <a:prstGeom prst="donut">
             <a:avLst>
@@ -2600,7 +3083,7 @@
       </p:grpSpPr>
       <p:pic>
         <p:nvPicPr>
-          <p:cNvPr id="59" name="" descr=""/>
+          <p:cNvPr id="62" name="" descr=""/>
           <p:cNvPicPr/>
           <p:nvPr/>
         </p:nvPicPr>
@@ -2611,7 +3094,7 @@
         <p:spPr>
           <a:xfrm>
             <a:off x="821520" y="687600"/>
-            <a:ext cx="8457840" cy="4295520"/>
+            <a:ext cx="8457480" cy="4295160"/>
           </a:xfrm>
           <a:prstGeom prst="rect">
             <a:avLst/>
@@ -2623,14 +3106,14 @@
       </p:pic>
       <p:sp>
         <p:nvSpPr>
-          <p:cNvPr id="60" name="CustomShape 1"/>
+          <p:cNvPr id="63" name="CustomShape 1"/>
           <p:cNvSpPr/>
           <p:nvPr/>
         </p:nvSpPr>
         <p:spPr>
           <a:xfrm>
             <a:off x="5909400" y="823320"/>
-            <a:ext cx="640080" cy="552240"/>
+            <a:ext cx="639720" cy="551880"/>
           </a:xfrm>
           <a:prstGeom prst="donut">
             <a:avLst>
@@ -2655,14 +3138,14 @@
       </p:sp>
       <p:sp>
         <p:nvSpPr>
-          <p:cNvPr id="61" name="CustomShape 2"/>
+          <p:cNvPr id="64" name="CustomShape 2"/>
           <p:cNvSpPr/>
           <p:nvPr/>
         </p:nvSpPr>
         <p:spPr>
           <a:xfrm>
             <a:off x="8077320" y="2714760"/>
-            <a:ext cx="640080" cy="552240"/>
+            <a:ext cx="639720" cy="551880"/>
           </a:xfrm>
           <a:prstGeom prst="donut">
             <a:avLst>
@@ -2922,4 +3405,230 @@
     </a:fmtScheme>
   </a:themeElements>
 </a:theme>
+</file>
+
+<file path=ppt/theme/theme2.xml><?xml version="1.0" encoding="utf-8"?>
+<a:theme xmlns:a="http://schemas.openxmlformats.org/drawingml/2006/main" name="Office Theme">
+  <a:themeElements>
+    <a:clrScheme name="Office">
+      <a:dk1>
+        <a:sysClr val="windowText" lastClr="000000"/>
+      </a:dk1>
+      <a:lt1>
+        <a:sysClr val="window" lastClr="FFFFFF"/>
+      </a:lt1>
+      <a:dk2>
+        <a:srgbClr val="1f497d"/>
+      </a:dk2>
+      <a:lt2>
+        <a:srgbClr val="eeece1"/>
+      </a:lt2>
+      <a:accent1>
+        <a:srgbClr val="4f81bd"/>
+      </a:accent1>
+      <a:accent2>
+        <a:srgbClr val="c0504d"/>
+      </a:accent2>
+      <a:accent3>
+        <a:srgbClr val="9bbb59"/>
+      </a:accent3>
+      <a:accent4>
+        <a:srgbClr val="8064a2"/>
+      </a:accent4>
+      <a:accent5>
+        <a:srgbClr val="4bacc6"/>
+      </a:accent5>
+      <a:accent6>
+        <a:srgbClr val="f79646"/>
+      </a:accent6>
+      <a:hlink>
+        <a:srgbClr val="0000ff"/>
+      </a:hlink>
+      <a:folHlink>
+        <a:srgbClr val="800080"/>
+      </a:folHlink>
+    </a:clrScheme>
+    <a:fontScheme name="Office">
+      <a:majorFont>
+        <a:latin typeface="Arial"/>
+        <a:ea typeface="DejaVu Sans"/>
+        <a:cs typeface="DejaVu Sans"/>
+      </a:majorFont>
+      <a:minorFont>
+        <a:latin typeface="Arial"/>
+        <a:ea typeface="DejaVu Sans"/>
+        <a:cs typeface="DejaVu Sans"/>
+      </a:minorFont>
+    </a:fontScheme>
+    <a:fmtScheme name="Office">
+      <a:fillStyleLst>
+        <a:solidFill>
+          <a:schemeClr val="phClr"/>
+        </a:solidFill>
+        <a:gradFill rotWithShape="1">
+          <a:gsLst>
+            <a:gs pos="0">
+              <a:schemeClr val="phClr">
+                <a:tint val="50000"/>
+                <a:satMod val="300000"/>
+              </a:schemeClr>
+            </a:gs>
+            <a:gs pos="35000">
+              <a:schemeClr val="phClr">
+                <a:tint val="37000"/>
+                <a:satMod val="300000"/>
+              </a:schemeClr>
+            </a:gs>
+            <a:gs pos="100000">
+              <a:schemeClr val="phClr">
+                <a:tint val="15000"/>
+                <a:satMod val="350000"/>
+              </a:schemeClr>
+            </a:gs>
+          </a:gsLst>
+          <a:lin ang="16200000" scaled="1"/>
+        </a:gradFill>
+        <a:gradFill rotWithShape="1">
+          <a:gsLst>
+            <a:gs pos="0">
+              <a:schemeClr val="phClr">
+                <a:shade val="51000"/>
+                <a:satMod val="130000"/>
+              </a:schemeClr>
+            </a:gs>
+            <a:gs pos="80000">
+              <a:schemeClr val="phClr">
+                <a:shade val="93000"/>
+                <a:satMod val="130000"/>
+              </a:schemeClr>
+            </a:gs>
+            <a:gs pos="100000">
+              <a:schemeClr val="phClr">
+                <a:shade val="94000"/>
+                <a:satMod val="135000"/>
+              </a:schemeClr>
+            </a:gs>
+          </a:gsLst>
+          <a:lin ang="16200000" scaled="0"/>
+        </a:gradFill>
+      </a:fillStyleLst>
+      <a:lnStyleLst>
+        <a:ln w="9525" cap="flat" cmpd="sng" algn="ctr">
+          <a:solidFill>
+            <a:schemeClr val="phClr">
+              <a:shade val="95000"/>
+              <a:satMod val="105000"/>
+            </a:schemeClr>
+          </a:solidFill>
+          <a:prstDash val="solid"/>
+          <a:miter/>
+        </a:ln>
+        <a:ln w="25400" cap="flat" cmpd="sng" algn="ctr">
+          <a:solidFill>
+            <a:schemeClr val="phClr"/>
+          </a:solidFill>
+          <a:prstDash val="solid"/>
+          <a:miter/>
+        </a:ln>
+        <a:ln w="38100" cap="flat" cmpd="sng" algn="ctr">
+          <a:solidFill>
+            <a:schemeClr val="phClr"/>
+          </a:solidFill>
+          <a:prstDash val="solid"/>
+          <a:miter/>
+        </a:ln>
+      </a:lnStyleLst>
+      <a:effectStyleLst>
+        <a:effectStyle>
+          <a:effectLst>
+            <a:outerShdw blurRad="40000" dist="20000" dir="5400000" rotWithShape="0">
+              <a:srgbClr val="000000">
+                <a:alpha val="38000"/>
+              </a:srgbClr>
+            </a:outerShdw>
+          </a:effectLst>
+        </a:effectStyle>
+        <a:effectStyle>
+          <a:effectLst>
+            <a:outerShdw blurRad="40000" dist="23000" dir="5400000" rotWithShape="0">
+              <a:srgbClr val="000000">
+                <a:alpha val="35000"/>
+              </a:srgbClr>
+            </a:outerShdw>
+          </a:effectLst>
+        </a:effectStyle>
+        <a:effectStyle>
+          <a:effectLst>
+            <a:outerShdw blurRad="40000" dist="23000" dir="5400000" rotWithShape="0">
+              <a:srgbClr val="000000">
+                <a:alpha val="35000"/>
+              </a:srgbClr>
+            </a:outerShdw>
+          </a:effectLst>
+          <a:scene3d>
+            <a:camera prst="orthographicFront">
+              <a:rot lat="0" lon="0" rev="0"/>
+            </a:camera>
+            <a:lightRig rig="threePt" dir="t">
+              <a:rot lat="0" lon="0" rev="1200000"/>
+            </a:lightRig>
+          </a:scene3d>
+          <a:sp3d>
+            <a:bevelT w="63500" h="25400"/>
+          </a:sp3d>
+        </a:effectStyle>
+      </a:effectStyleLst>
+      <a:bgFillStyleLst>
+        <a:solidFill>
+          <a:schemeClr val="phClr"/>
+        </a:solidFill>
+        <a:gradFill rotWithShape="1">
+          <a:gsLst>
+            <a:gs pos="0">
+              <a:schemeClr val="phClr">
+                <a:tint val="40000"/>
+                <a:satMod val="350000"/>
+              </a:schemeClr>
+            </a:gs>
+            <a:gs pos="40000">
+              <a:schemeClr val="phClr">
+                <a:tint val="45000"/>
+                <a:shade val="99000"/>
+                <a:satMod val="350000"/>
+              </a:schemeClr>
+            </a:gs>
+            <a:gs pos="100000">
+              <a:schemeClr val="phClr">
+                <a:shade val="20000"/>
+                <a:satMod val="255000"/>
+              </a:schemeClr>
+            </a:gs>
+          </a:gsLst>
+          <a:path path="circle">
+            <a:fillToRect l="50000" t="-80000" r="50000" b="180000"/>
+          </a:path>
+        </a:gradFill>
+        <a:gradFill rotWithShape="1">
+          <a:gsLst>
+            <a:gs pos="0">
+              <a:schemeClr val="phClr">
+                <a:tint val="80000"/>
+                <a:satMod val="300000"/>
+              </a:schemeClr>
+            </a:gs>
+            <a:gs pos="100000">
+              <a:schemeClr val="phClr">
+                <a:shade val="30000"/>
+                <a:satMod val="200000"/>
+              </a:schemeClr>
+            </a:gs>
+          </a:gsLst>
+          <a:path path="circle">
+            <a:fillToRect l="50000" t="50000" r="50000" b="50000"/>
+          </a:path>
+        </a:gradFill>
+      </a:bgFillStyleLst>
+    </a:fmtScheme>
+  </a:themeElements>
+</a:theme>
 </file>
</xml_diff>

<commit_message>
Adds updated files from presentation
</commit_message>
<xml_diff>
--- a/Domain_Model_Presentation.pptx
+++ b/Domain_Model_Presentation.pptx
@@ -13,6 +13,7 @@
     <p:sldId id="258" r:id="rId6"/>
     <p:sldId id="259" r:id="rId7"/>
     <p:sldId id="260" r:id="rId8"/>
+    <p:sldId id="261" r:id="rId9"/>
   </p:sldIdLst>
   <p:sldSz cx="10080625" cy="5670550"/>
   <p:notesSz cx="7772400" cy="10058400"/>
@@ -243,7 +244,7 @@
           </a:bodyPr>
           <a:p>
             <a:pPr algn="r"/>
-            <a:fld id="{92E20F6B-8356-4154-9BD7-5AB979D4DD2B}" type="slidenum">
+            <a:fld id="{B43173B7-7244-4843-8A4C-5145C3D00029}" type="slidenum">
               <a:rPr b="0" lang="en-US" sz="1400" spc="-1" strike="noStrike">
                 <a:latin typeface="Times New Roman"/>
               </a:rPr>
@@ -280,7 +281,7 @@
       </p:grpSpPr>
       <p:sp>
         <p:nvSpPr>
-          <p:cNvPr id="65" name="PlaceHolder 1"/>
+          <p:cNvPr id="55" name="PlaceHolder 1"/>
           <p:cNvSpPr>
             <a:spLocks noGrp="1"/>
           </p:cNvSpPr>
@@ -291,16 +292,16 @@
         <p:spPr>
           <a:xfrm>
             <a:off x="533520" y="764280"/>
-            <a:ext cx="6704280" cy="3771000"/>
-          </a:xfrm>
-          <a:prstGeom prst="rect">
-            <a:avLst/>
-          </a:prstGeom>
-        </p:spPr>
-      </p:sp>
-      <p:sp>
-        <p:nvSpPr>
-          <p:cNvPr id="66" name="PlaceHolder 2"/>
+            <a:ext cx="6703560" cy="3770280"/>
+          </a:xfrm>
+          <a:prstGeom prst="rect">
+            <a:avLst/>
+          </a:prstGeom>
+        </p:spPr>
+      </p:sp>
+      <p:sp>
+        <p:nvSpPr>
+          <p:cNvPr id="56" name="PlaceHolder 2"/>
           <p:cNvSpPr>
             <a:spLocks noGrp="1"/>
           </p:cNvSpPr>
@@ -311,7 +312,7 @@
         <p:spPr>
           <a:xfrm>
             <a:off x="777240" y="4777560"/>
-            <a:ext cx="6217200" cy="4525560"/>
+            <a:ext cx="6216480" cy="4524840"/>
           </a:xfrm>
           <a:prstGeom prst="rect">
             <a:avLst/>
@@ -322,355 +323,13 @@
             <a:noAutofit/>
           </a:bodyPr>
           <a:p>
-            <a:pPr marL="216000" indent="-216000">
+            <a:pPr marL="216000" indent="-215280">
               <a:lnSpc>
                 <a:spcPct val="100000"/>
               </a:lnSpc>
-            </a:pPr>
-            <a:r>
-              <a:rPr b="0" lang="en-US" sz="2000" spc="-1" strike="noStrike">
-                <a:latin typeface="Arial"/>
-              </a:rPr>
-              <a:t>So you can see here that a </a:t>
-            </a:r>
-            <a:r>
-              <a:rPr b="1" lang="en-US" sz="2000" spc="-1" strike="noStrike">
-                <a:latin typeface="Arial"/>
-              </a:rPr>
-              <a:t>user</a:t>
-            </a:r>
-            <a:r>
-              <a:rPr b="0" lang="en-US" sz="2000" spc="-1" strike="noStrike">
-                <a:latin typeface="Arial"/>
-              </a:rPr>
-              <a:t> could have be free a variety of </a:t>
-            </a:r>
-            <a:r>
-              <a:rPr b="1" lang="en-US" sz="2000" spc="-1" strike="noStrike">
-                <a:latin typeface="Arial"/>
-              </a:rPr>
-              <a:t>times</a:t>
-            </a:r>
-            <a:r>
-              <a:rPr b="0" lang="en-US" sz="2000" spc="-1" strike="noStrike">
-                <a:latin typeface="Arial"/>
-              </a:rPr>
-              <a:t> during the week or not at all.</a:t>
-            </a:r>
-            <a:endParaRPr b="0" lang="en-US" sz="2000" spc="-1" strike="noStrike">
-              <a:latin typeface="Arial"/>
-            </a:endParaRPr>
-          </a:p>
-        </p:txBody>
-      </p:sp>
-    </p:spTree>
-  </p:cSld>
-</p:notes>
-</file>
-
-<file path=ppt/notesSlides/notesSlide2.xml><?xml version="1.0" encoding="utf-8"?>
-<p:notes xmlns:a="http://schemas.openxmlformats.org/drawingml/2006/main" xmlns:p="http://schemas.openxmlformats.org/presentationml/2006/main" xmlns:r="http://schemas.openxmlformats.org/officeDocument/2006/relationships" xmlns:p14="http://schemas.microsoft.com/office/powerpoint/2010/main" xmlns:p15="http://schemas.microsoft.com/office/powerpoint/2012/main" xmlns:mc="http://schemas.openxmlformats.org/markup-compatibility/2006">
-  <p:cSld>
-    <p:spTree>
-      <p:nvGrpSpPr>
-        <p:cNvPr id="1" name=""/>
-        <p:cNvGrpSpPr/>
-        <p:nvPr/>
-      </p:nvGrpSpPr>
-      <p:grpSpPr>
-        <a:xfrm>
-          <a:off x="0" y="0"/>
-          <a:ext cx="0" cy="0"/>
-          <a:chOff x="0" y="0"/>
-          <a:chExt cx="0" cy="0"/>
-        </a:xfrm>
-      </p:grpSpPr>
-      <p:sp>
-        <p:nvSpPr>
-          <p:cNvPr id="67" name="PlaceHolder 1"/>
-          <p:cNvSpPr>
-            <a:spLocks noGrp="1"/>
-          </p:cNvSpPr>
-          <p:nvPr>
-            <p:ph type="sldImg"/>
-          </p:nvPr>
-        </p:nvSpPr>
-        <p:spPr>
-          <a:xfrm>
-            <a:off x="533520" y="764280"/>
-            <a:ext cx="6704280" cy="3771000"/>
-          </a:xfrm>
-          <a:prstGeom prst="rect">
-            <a:avLst/>
-          </a:prstGeom>
-        </p:spPr>
-      </p:sp>
-      <p:sp>
-        <p:nvSpPr>
-          <p:cNvPr id="68" name="PlaceHolder 2"/>
-          <p:cNvSpPr>
-            <a:spLocks noGrp="1"/>
-          </p:cNvSpPr>
-          <p:nvPr>
-            <p:ph type="body"/>
-          </p:nvPr>
-        </p:nvSpPr>
-        <p:spPr>
-          <a:xfrm>
-            <a:off x="777240" y="4777560"/>
-            <a:ext cx="6217200" cy="4525560"/>
-          </a:xfrm>
-          <a:prstGeom prst="rect">
-            <a:avLst/>
-          </a:prstGeom>
-        </p:spPr>
-        <p:txBody>
-          <a:bodyPr lIns="0" rIns="0" tIns="0" bIns="0">
-            <a:noAutofit/>
-          </a:bodyPr>
-          <a:p>
-            <a:pPr marL="216000" indent="-216000">
-              <a:lnSpc>
-                <a:spcPct val="100000"/>
-              </a:lnSpc>
-            </a:pPr>
-            <a:r>
-              <a:rPr b="0" lang="en-US" sz="2000" spc="-1" strike="noStrike">
-                <a:latin typeface="Arial"/>
-              </a:rPr>
-              <a:t>Similarly, a </a:t>
-            </a:r>
-            <a:r>
-              <a:rPr b="1" lang="en-US" sz="2000" spc="-1" strike="noStrike">
-                <a:latin typeface="Arial"/>
-              </a:rPr>
-              <a:t>user</a:t>
-            </a:r>
-            <a:r>
-              <a:rPr b="0" lang="en-US" sz="2000" spc="-1" strike="noStrike">
-                <a:latin typeface="Arial"/>
-              </a:rPr>
-              <a:t> could be a part of as many </a:t>
-            </a:r>
-            <a:r>
-              <a:rPr b="1" lang="en-US" sz="2000" spc="-1" strike="noStrike">
-                <a:latin typeface="Arial"/>
-              </a:rPr>
-              <a:t>groups</a:t>
-            </a:r>
-            <a:r>
-              <a:rPr b="0" lang="en-US" sz="2000" spc="-1" strike="noStrike">
-                <a:latin typeface="Arial"/>
-              </a:rPr>
-              <a:t> as possible, or none at all. However, a </a:t>
-            </a:r>
-            <a:r>
-              <a:rPr b="1" lang="en-US" sz="2000" spc="-1" strike="noStrike">
-                <a:latin typeface="Arial"/>
-              </a:rPr>
-              <a:t>group</a:t>
-            </a:r>
-            <a:r>
-              <a:rPr b="0" lang="en-US" sz="2000" spc="-1" strike="noStrike">
-                <a:latin typeface="Arial"/>
-              </a:rPr>
-              <a:t> has to have at least one </a:t>
-            </a:r>
-            <a:r>
-              <a:rPr b="1" lang="en-US" sz="2000" spc="-1" strike="noStrike">
-                <a:latin typeface="Arial"/>
-              </a:rPr>
-              <a:t>user</a:t>
-            </a:r>
-            <a:r>
-              <a:rPr b="0" lang="en-US" sz="2000" spc="-1" strike="noStrike">
-                <a:latin typeface="Arial"/>
-              </a:rPr>
-              <a:t> as a group member.</a:t>
-            </a:r>
-            <a:endParaRPr b="0" lang="en-US" sz="2000" spc="-1" strike="noStrike">
-              <a:latin typeface="Arial"/>
-            </a:endParaRPr>
-          </a:p>
-        </p:txBody>
-      </p:sp>
-    </p:spTree>
-  </p:cSld>
-</p:notes>
-</file>
-
-<file path=ppt/notesSlides/notesSlide3.xml><?xml version="1.0" encoding="utf-8"?>
-<p:notes xmlns:a="http://schemas.openxmlformats.org/drawingml/2006/main" xmlns:p="http://schemas.openxmlformats.org/presentationml/2006/main" xmlns:r="http://schemas.openxmlformats.org/officeDocument/2006/relationships" xmlns:p14="http://schemas.microsoft.com/office/powerpoint/2010/main" xmlns:p15="http://schemas.microsoft.com/office/powerpoint/2012/main" xmlns:mc="http://schemas.openxmlformats.org/markup-compatibility/2006">
-  <p:cSld>
-    <p:spTree>
-      <p:nvGrpSpPr>
-        <p:cNvPr id="1" name=""/>
-        <p:cNvGrpSpPr/>
-        <p:nvPr/>
-      </p:nvGrpSpPr>
-      <p:grpSpPr>
-        <a:xfrm>
-          <a:off x="0" y="0"/>
-          <a:ext cx="0" cy="0"/>
-          <a:chOff x="0" y="0"/>
-          <a:chExt cx="0" cy="0"/>
-        </a:xfrm>
-      </p:grpSpPr>
-      <p:sp>
-        <p:nvSpPr>
-          <p:cNvPr id="69" name="PlaceHolder 1"/>
-          <p:cNvSpPr>
-            <a:spLocks noGrp="1"/>
-          </p:cNvSpPr>
-          <p:nvPr>
-            <p:ph type="sldImg"/>
-          </p:nvPr>
-        </p:nvSpPr>
-        <p:spPr>
-          <a:xfrm>
-            <a:off x="533520" y="764280"/>
-            <a:ext cx="6704280" cy="3771000"/>
-          </a:xfrm>
-          <a:prstGeom prst="rect">
-            <a:avLst/>
-          </a:prstGeom>
-        </p:spPr>
-      </p:sp>
-      <p:sp>
-        <p:nvSpPr>
-          <p:cNvPr id="70" name="PlaceHolder 2"/>
-          <p:cNvSpPr>
-            <a:spLocks noGrp="1"/>
-          </p:cNvSpPr>
-          <p:nvPr>
-            <p:ph type="body"/>
-          </p:nvPr>
-        </p:nvSpPr>
-        <p:spPr>
-          <a:xfrm>
-            <a:off x="777240" y="4777560"/>
-            <a:ext cx="6217200" cy="4525560"/>
-          </a:xfrm>
-          <a:prstGeom prst="rect">
-            <a:avLst/>
-          </a:prstGeom>
-        </p:spPr>
-        <p:txBody>
-          <a:bodyPr lIns="0" rIns="0" tIns="0" bIns="0">
-            <a:noAutofit/>
-          </a:bodyPr>
-          <a:p>
-            <a:pPr marL="216000" indent="-216000">
-              <a:lnSpc>
-                <a:spcPct val="100000"/>
-              </a:lnSpc>
-            </a:pPr>
-            <a:r>
-              <a:rPr b="0" lang="en-US" sz="2000" spc="-1" strike="noStrike">
-                <a:latin typeface="Arial"/>
-              </a:rPr>
-              <a:t>And finally, a </a:t>
-            </a:r>
-            <a:r>
-              <a:rPr b="1" lang="en-US" sz="2000" spc="-1" strike="noStrike">
-                <a:latin typeface="Arial"/>
-              </a:rPr>
-              <a:t>user</a:t>
-            </a:r>
-            <a:r>
-              <a:rPr b="0" lang="en-US" sz="2000" spc="-1" strike="noStrike">
-                <a:latin typeface="Arial"/>
-              </a:rPr>
-              <a:t> can be a participant in as many </a:t>
-            </a:r>
-            <a:r>
-              <a:rPr b="1" lang="en-US" sz="2000" spc="-1" strike="noStrike">
-                <a:latin typeface="Arial"/>
-              </a:rPr>
-              <a:t>events</a:t>
-            </a:r>
-            <a:r>
-              <a:rPr b="0" lang="en-US" sz="2000" spc="-1" strike="noStrike">
-                <a:latin typeface="Arial"/>
-              </a:rPr>
-              <a:t> as they want, or none at all.</a:t>
-            </a:r>
-            <a:endParaRPr b="0" lang="en-US" sz="2000" spc="-1" strike="noStrike">
-              <a:latin typeface="Arial"/>
-            </a:endParaRPr>
-          </a:p>
-        </p:txBody>
-      </p:sp>
-    </p:spTree>
-  </p:cSld>
-</p:notes>
-</file>
-
-<file path=ppt/notesSlides/notesSlide4.xml><?xml version="1.0" encoding="utf-8"?>
-<p:notes xmlns:a="http://schemas.openxmlformats.org/drawingml/2006/main" xmlns:p="http://schemas.openxmlformats.org/presentationml/2006/main" xmlns:r="http://schemas.openxmlformats.org/officeDocument/2006/relationships" xmlns:p14="http://schemas.microsoft.com/office/powerpoint/2010/main" xmlns:p15="http://schemas.microsoft.com/office/powerpoint/2012/main" xmlns:mc="http://schemas.openxmlformats.org/markup-compatibility/2006">
-  <p:cSld>
-    <p:spTree>
-      <p:nvGrpSpPr>
-        <p:cNvPr id="1" name=""/>
-        <p:cNvGrpSpPr/>
-        <p:nvPr/>
-      </p:nvGrpSpPr>
-      <p:grpSpPr>
-        <a:xfrm>
-          <a:off x="0" y="0"/>
-          <a:ext cx="0" cy="0"/>
-          <a:chOff x="0" y="0"/>
-          <a:chExt cx="0" cy="0"/>
-        </a:xfrm>
-      </p:grpSpPr>
-      <p:sp>
-        <p:nvSpPr>
-          <p:cNvPr id="71" name="PlaceHolder 1"/>
-          <p:cNvSpPr>
-            <a:spLocks noGrp="1"/>
-          </p:cNvSpPr>
-          <p:nvPr>
-            <p:ph type="sldImg"/>
-          </p:nvPr>
-        </p:nvSpPr>
-        <p:spPr>
-          <a:xfrm>
-            <a:off x="533520" y="764280"/>
-            <a:ext cx="6704280" cy="3771000"/>
-          </a:xfrm>
-          <a:prstGeom prst="rect">
-            <a:avLst/>
-          </a:prstGeom>
-        </p:spPr>
-      </p:sp>
-      <p:sp>
-        <p:nvSpPr>
-          <p:cNvPr id="72" name="PlaceHolder 2"/>
-          <p:cNvSpPr>
-            <a:spLocks noGrp="1"/>
-          </p:cNvSpPr>
-          <p:nvPr>
-            <p:ph type="body"/>
-          </p:nvPr>
-        </p:nvSpPr>
-        <p:spPr>
-          <a:xfrm>
-            <a:off x="777240" y="4777560"/>
-            <a:ext cx="6217200" cy="4525560"/>
-          </a:xfrm>
-          <a:prstGeom prst="rect">
-            <a:avLst/>
-          </a:prstGeom>
-        </p:spPr>
-        <p:txBody>
-          <a:bodyPr lIns="0" rIns="0" tIns="0" bIns="0">
-            <a:noAutofit/>
-          </a:bodyPr>
-          <a:p>
-            <a:pPr marL="216000" indent="-216000">
-              <a:lnSpc>
-                <a:spcPct val="100000"/>
-              </a:lnSpc>
+              <a:tabLst>
+                <a:tab algn="l" pos="0"/>
+              </a:tabLst>
             </a:pPr>
             <a:r>
               <a:rPr b="1" lang="en-US" sz="2000" spc="-1" strike="noStrike">
@@ -707,7 +366,7 @@
 </p:notes>
 </file>
 
-<file path=ppt/notesSlides/notesSlide5.xml><?xml version="1.0" encoding="utf-8"?>
+<file path=ppt/notesSlides/notesSlide2.xml><?xml version="1.0" encoding="utf-8"?>
 <p:notes xmlns:a="http://schemas.openxmlformats.org/drawingml/2006/main" xmlns:p="http://schemas.openxmlformats.org/presentationml/2006/main" xmlns:r="http://schemas.openxmlformats.org/officeDocument/2006/relationships" xmlns:p14="http://schemas.microsoft.com/office/powerpoint/2010/main" xmlns:p15="http://schemas.microsoft.com/office/powerpoint/2012/main" xmlns:mc="http://schemas.openxmlformats.org/markup-compatibility/2006">
   <p:cSld>
     <p:spTree>
@@ -726,7 +385,7 @@
       </p:grpSpPr>
       <p:sp>
         <p:nvSpPr>
-          <p:cNvPr id="73" name="PlaceHolder 1"/>
+          <p:cNvPr id="57" name="PlaceHolder 1"/>
           <p:cNvSpPr>
             <a:spLocks noGrp="1"/>
           </p:cNvSpPr>
@@ -737,16 +396,16 @@
         <p:spPr>
           <a:xfrm>
             <a:off x="533520" y="764280"/>
-            <a:ext cx="6704280" cy="3771000"/>
-          </a:xfrm>
-          <a:prstGeom prst="rect">
-            <a:avLst/>
-          </a:prstGeom>
-        </p:spPr>
-      </p:sp>
-      <p:sp>
-        <p:nvSpPr>
-          <p:cNvPr id="74" name="PlaceHolder 2"/>
+            <a:ext cx="6703560" cy="3770280"/>
+          </a:xfrm>
+          <a:prstGeom prst="rect">
+            <a:avLst/>
+          </a:prstGeom>
+        </p:spPr>
+      </p:sp>
+      <p:sp>
+        <p:nvSpPr>
+          <p:cNvPr id="58" name="PlaceHolder 2"/>
           <p:cNvSpPr>
             <a:spLocks noGrp="1"/>
           </p:cNvSpPr>
@@ -757,7 +416,7 @@
         <p:spPr>
           <a:xfrm>
             <a:off x="777240" y="4777560"/>
-            <a:ext cx="6217200" cy="4525560"/>
+            <a:ext cx="6216480" cy="4524840"/>
           </a:xfrm>
           <a:prstGeom prst="rect">
             <a:avLst/>
@@ -768,40 +427,349 @@
             <a:noAutofit/>
           </a:bodyPr>
           <a:p>
-            <a:pPr marL="216000" indent="-216000">
+            <a:pPr marL="216000" indent="-215280">
               <a:lnSpc>
                 <a:spcPct val="100000"/>
               </a:lnSpc>
+              <a:tabLst>
+                <a:tab algn="l" pos="0"/>
+              </a:tabLst>
             </a:pPr>
+            <a:r>
+              <a:rPr b="1" lang="en-US" sz="2000" spc="-1" strike="noStrike">
+                <a:latin typeface="Arial"/>
+              </a:rPr>
+              <a:t>Groups</a:t>
+            </a:r>
             <a:r>
               <a:rPr b="0" lang="en-US" sz="2000" spc="-1" strike="noStrike">
                 <a:latin typeface="Arial"/>
               </a:rPr>
-              <a:t>And finally, an </a:t>
+              <a:t>, just like users, are able to be a part of as many </a:t>
             </a:r>
             <a:r>
               <a:rPr b="1" lang="en-US" sz="2000" spc="-1" strike="noStrike">
                 <a:latin typeface="Arial"/>
               </a:rPr>
-              <a:t>event</a:t>
+              <a:t>events</a:t>
             </a:r>
             <a:r>
               <a:rPr b="0" lang="en-US" sz="2000" spc="-1" strike="noStrike">
                 <a:latin typeface="Arial"/>
               </a:rPr>
-              <a:t> can only happen once, so it only has one </a:t>
+              <a:t> as possible, or none at all.</a:t>
+            </a:r>
+            <a:endParaRPr b="0" lang="en-US" sz="2000" spc="-1" strike="noStrike">
+              <a:latin typeface="Arial"/>
+            </a:endParaRPr>
+          </a:p>
+        </p:txBody>
+      </p:sp>
+    </p:spTree>
+  </p:cSld>
+</p:notes>
+</file>
+
+<file path=ppt/notesSlides/notesSlide3.xml><?xml version="1.0" encoding="utf-8"?>
+<p:notes xmlns:a="http://schemas.openxmlformats.org/drawingml/2006/main" xmlns:p="http://schemas.openxmlformats.org/presentationml/2006/main" xmlns:r="http://schemas.openxmlformats.org/officeDocument/2006/relationships" xmlns:p14="http://schemas.microsoft.com/office/powerpoint/2010/main" xmlns:p15="http://schemas.microsoft.com/office/powerpoint/2012/main" xmlns:mc="http://schemas.openxmlformats.org/markup-compatibility/2006">
+  <p:cSld>
+    <p:spTree>
+      <p:nvGrpSpPr>
+        <p:cNvPr id="1" name=""/>
+        <p:cNvGrpSpPr/>
+        <p:nvPr/>
+      </p:nvGrpSpPr>
+      <p:grpSpPr>
+        <a:xfrm>
+          <a:off x="0" y="0"/>
+          <a:ext cx="0" cy="0"/>
+          <a:chOff x="0" y="0"/>
+          <a:chExt cx="0" cy="0"/>
+        </a:xfrm>
+      </p:grpSpPr>
+      <p:sp>
+        <p:nvSpPr>
+          <p:cNvPr id="59" name="PlaceHolder 1"/>
+          <p:cNvSpPr>
+            <a:spLocks noGrp="1"/>
+          </p:cNvSpPr>
+          <p:nvPr>
+            <p:ph type="sldImg"/>
+          </p:nvPr>
+        </p:nvSpPr>
+        <p:spPr>
+          <a:xfrm>
+            <a:off x="533520" y="764280"/>
+            <a:ext cx="6703560" cy="3770280"/>
+          </a:xfrm>
+          <a:prstGeom prst="rect">
+            <a:avLst/>
+          </a:prstGeom>
+        </p:spPr>
+      </p:sp>
+      <p:sp>
+        <p:nvSpPr>
+          <p:cNvPr id="60" name="PlaceHolder 2"/>
+          <p:cNvSpPr>
+            <a:spLocks noGrp="1"/>
+          </p:cNvSpPr>
+          <p:nvPr>
+            <p:ph type="body"/>
+          </p:nvPr>
+        </p:nvSpPr>
+        <p:spPr>
+          <a:xfrm>
+            <a:off x="777240" y="4777560"/>
+            <a:ext cx="6216480" cy="4524840"/>
+          </a:xfrm>
+          <a:prstGeom prst="rect">
+            <a:avLst/>
+          </a:prstGeom>
+        </p:spPr>
+        <p:txBody>
+          <a:bodyPr lIns="0" rIns="0" tIns="0" bIns="0">
+            <a:noAutofit/>
+          </a:bodyPr>
+          <a:p>
+            <a:pPr marL="216000" indent="-215280">
+              <a:lnSpc>
+                <a:spcPct val="100000"/>
+              </a:lnSpc>
+              <a:tabLst>
+                <a:tab algn="l" pos="0"/>
+              </a:tabLst>
+            </a:pPr>
+            <a:r>
+              <a:rPr b="1" lang="en-US" sz="2000" spc="-1" strike="noStrike">
+                <a:latin typeface="Arial"/>
+              </a:rPr>
+              <a:t>Groups</a:t>
+            </a:r>
+            <a:r>
+              <a:rPr b="0" lang="en-US" sz="2000" spc="-1" strike="noStrike">
+                <a:latin typeface="Arial"/>
+              </a:rPr>
+              <a:t>, just like users, are able to be a part of as many </a:t>
             </a:r>
             <a:r>
               <a:rPr b="1" lang="en-US" sz="2000" spc="-1" strike="noStrike">
                 <a:latin typeface="Arial"/>
               </a:rPr>
-              <a:t>time</a:t>
+              <a:t>events</a:t>
             </a:r>
             <a:r>
               <a:rPr b="0" lang="en-US" sz="2000" spc="-1" strike="noStrike">
                 <a:latin typeface="Arial"/>
               </a:rPr>
-              <a:t>.</a:t>
+              <a:t> as possible, or none at all.</a:t>
+            </a:r>
+            <a:endParaRPr b="0" lang="en-US" sz="2000" spc="-1" strike="noStrike">
+              <a:latin typeface="Arial"/>
+            </a:endParaRPr>
+          </a:p>
+        </p:txBody>
+      </p:sp>
+    </p:spTree>
+  </p:cSld>
+</p:notes>
+</file>
+
+<file path=ppt/notesSlides/notesSlide4.xml><?xml version="1.0" encoding="utf-8"?>
+<p:notes xmlns:a="http://schemas.openxmlformats.org/drawingml/2006/main" xmlns:p="http://schemas.openxmlformats.org/presentationml/2006/main" xmlns:r="http://schemas.openxmlformats.org/officeDocument/2006/relationships" xmlns:p14="http://schemas.microsoft.com/office/powerpoint/2010/main" xmlns:p15="http://schemas.microsoft.com/office/powerpoint/2012/main" xmlns:mc="http://schemas.openxmlformats.org/markup-compatibility/2006">
+  <p:cSld>
+    <p:spTree>
+      <p:nvGrpSpPr>
+        <p:cNvPr id="1" name=""/>
+        <p:cNvGrpSpPr/>
+        <p:nvPr/>
+      </p:nvGrpSpPr>
+      <p:grpSpPr>
+        <a:xfrm>
+          <a:off x="0" y="0"/>
+          <a:ext cx="0" cy="0"/>
+          <a:chOff x="0" y="0"/>
+          <a:chExt cx="0" cy="0"/>
+        </a:xfrm>
+      </p:grpSpPr>
+      <p:sp>
+        <p:nvSpPr>
+          <p:cNvPr id="61" name="PlaceHolder 1"/>
+          <p:cNvSpPr>
+            <a:spLocks noGrp="1"/>
+          </p:cNvSpPr>
+          <p:nvPr>
+            <p:ph type="sldImg"/>
+          </p:nvPr>
+        </p:nvSpPr>
+        <p:spPr>
+          <a:xfrm>
+            <a:off x="533520" y="764280"/>
+            <a:ext cx="6703560" cy="3770280"/>
+          </a:xfrm>
+          <a:prstGeom prst="rect">
+            <a:avLst/>
+          </a:prstGeom>
+        </p:spPr>
+      </p:sp>
+      <p:sp>
+        <p:nvSpPr>
+          <p:cNvPr id="62" name="PlaceHolder 2"/>
+          <p:cNvSpPr>
+            <a:spLocks noGrp="1"/>
+          </p:cNvSpPr>
+          <p:nvPr>
+            <p:ph type="body"/>
+          </p:nvPr>
+        </p:nvSpPr>
+        <p:spPr>
+          <a:xfrm>
+            <a:off x="777240" y="4777560"/>
+            <a:ext cx="6216480" cy="4524840"/>
+          </a:xfrm>
+          <a:prstGeom prst="rect">
+            <a:avLst/>
+          </a:prstGeom>
+        </p:spPr>
+        <p:txBody>
+          <a:bodyPr lIns="0" rIns="0" tIns="0" bIns="0">
+            <a:noAutofit/>
+          </a:bodyPr>
+          <a:p>
+            <a:pPr marL="216000" indent="-215280">
+              <a:lnSpc>
+                <a:spcPct val="100000"/>
+              </a:lnSpc>
+              <a:tabLst>
+                <a:tab algn="l" pos="0"/>
+              </a:tabLst>
+            </a:pPr>
+            <a:r>
+              <a:rPr b="1" lang="en-US" sz="2000" spc="-1" strike="noStrike">
+                <a:latin typeface="Arial"/>
+              </a:rPr>
+              <a:t>Groups</a:t>
+            </a:r>
+            <a:r>
+              <a:rPr b="0" lang="en-US" sz="2000" spc="-1" strike="noStrike">
+                <a:latin typeface="Arial"/>
+              </a:rPr>
+              <a:t>, just like users, are able to be a part of as many </a:t>
+            </a:r>
+            <a:r>
+              <a:rPr b="1" lang="en-US" sz="2000" spc="-1" strike="noStrike">
+                <a:latin typeface="Arial"/>
+              </a:rPr>
+              <a:t>events</a:t>
+            </a:r>
+            <a:r>
+              <a:rPr b="0" lang="en-US" sz="2000" spc="-1" strike="noStrike">
+                <a:latin typeface="Arial"/>
+              </a:rPr>
+              <a:t> as possible, or none at all.</a:t>
+            </a:r>
+            <a:endParaRPr b="0" lang="en-US" sz="2000" spc="-1" strike="noStrike">
+              <a:latin typeface="Arial"/>
+            </a:endParaRPr>
+          </a:p>
+        </p:txBody>
+      </p:sp>
+    </p:spTree>
+  </p:cSld>
+</p:notes>
+</file>
+
+<file path=ppt/notesSlides/notesSlide6.xml><?xml version="1.0" encoding="utf-8"?>
+<p:notes xmlns:a="http://schemas.openxmlformats.org/drawingml/2006/main" xmlns:p="http://schemas.openxmlformats.org/presentationml/2006/main" xmlns:r="http://schemas.openxmlformats.org/officeDocument/2006/relationships" xmlns:p14="http://schemas.microsoft.com/office/powerpoint/2010/main" xmlns:p15="http://schemas.microsoft.com/office/powerpoint/2012/main" xmlns:mc="http://schemas.openxmlformats.org/markup-compatibility/2006">
+  <p:cSld>
+    <p:spTree>
+      <p:nvGrpSpPr>
+        <p:cNvPr id="1" name=""/>
+        <p:cNvGrpSpPr/>
+        <p:nvPr/>
+      </p:nvGrpSpPr>
+      <p:grpSpPr>
+        <a:xfrm>
+          <a:off x="0" y="0"/>
+          <a:ext cx="0" cy="0"/>
+          <a:chOff x="0" y="0"/>
+          <a:chExt cx="0" cy="0"/>
+        </a:xfrm>
+      </p:grpSpPr>
+      <p:sp>
+        <p:nvSpPr>
+          <p:cNvPr id="63" name="PlaceHolder 1"/>
+          <p:cNvSpPr>
+            <a:spLocks noGrp="1"/>
+          </p:cNvSpPr>
+          <p:nvPr>
+            <p:ph type="sldImg"/>
+          </p:nvPr>
+        </p:nvSpPr>
+        <p:spPr>
+          <a:xfrm>
+            <a:off x="533520" y="764280"/>
+            <a:ext cx="6703560" cy="3770280"/>
+          </a:xfrm>
+          <a:prstGeom prst="rect">
+            <a:avLst/>
+          </a:prstGeom>
+        </p:spPr>
+      </p:sp>
+      <p:sp>
+        <p:nvSpPr>
+          <p:cNvPr id="64" name="PlaceHolder 2"/>
+          <p:cNvSpPr>
+            <a:spLocks noGrp="1"/>
+          </p:cNvSpPr>
+          <p:nvPr>
+            <p:ph type="body"/>
+          </p:nvPr>
+        </p:nvSpPr>
+        <p:spPr>
+          <a:xfrm>
+            <a:off x="777240" y="4777560"/>
+            <a:ext cx="6216480" cy="4524840"/>
+          </a:xfrm>
+          <a:prstGeom prst="rect">
+            <a:avLst/>
+          </a:prstGeom>
+        </p:spPr>
+        <p:txBody>
+          <a:bodyPr lIns="0" rIns="0" tIns="0" bIns="0">
+            <a:noAutofit/>
+          </a:bodyPr>
+          <a:p>
+            <a:pPr marL="216000" indent="-215280">
+              <a:lnSpc>
+                <a:spcPct val="100000"/>
+              </a:lnSpc>
+              <a:tabLst>
+                <a:tab algn="l" pos="0"/>
+              </a:tabLst>
+            </a:pPr>
+            <a:r>
+              <a:rPr b="1" lang="en-US" sz="2000" spc="-1" strike="noStrike">
+                <a:latin typeface="Arial"/>
+              </a:rPr>
+              <a:t>Groups</a:t>
+            </a:r>
+            <a:r>
+              <a:rPr b="0" lang="en-US" sz="2000" spc="-1" strike="noStrike">
+                <a:latin typeface="Arial"/>
+              </a:rPr>
+              <a:t>, just like users, are able to be a part of as many </a:t>
+            </a:r>
+            <a:r>
+              <a:rPr b="1" lang="en-US" sz="2000" spc="-1" strike="noStrike">
+                <a:latin typeface="Arial"/>
+              </a:rPr>
+              <a:t>events</a:t>
+            </a:r>
+            <a:r>
+              <a:rPr b="0" lang="en-US" sz="2000" spc="-1" strike="noStrike">
+                <a:latin typeface="Arial"/>
+              </a:rPr>
+              <a:t> as possible, or none at all.</a:t>
             </a:r>
             <a:endParaRPr b="0" lang="en-US" sz="2000" spc="-1" strike="noStrike">
               <a:latin typeface="Arial"/>
@@ -866,7 +834,7 @@
         <p:spPr>
           <a:xfrm>
             <a:off x="504000" y="226080"/>
-            <a:ext cx="9070920" cy="945720"/>
+            <a:ext cx="9072000" cy="946440"/>
           </a:xfrm>
           <a:prstGeom prst="rect">
             <a:avLst/>
@@ -897,7 +865,7 @@
         <p:spPr>
           <a:xfrm>
             <a:off x="504000" y="1326600"/>
-            <a:ext cx="9071640" cy="1568160"/>
+            <a:ext cx="9072000" cy="1568520"/>
           </a:xfrm>
           <a:prstGeom prst="rect">
             <a:avLst/>
@@ -926,8 +894,8 @@
         </p:nvSpPr>
         <p:spPr>
           <a:xfrm>
-            <a:off x="504000" y="3044160"/>
-            <a:ext cx="9071640" cy="1568160"/>
+            <a:off x="504000" y="3044520"/>
+            <a:ext cx="9072000" cy="1568520"/>
           </a:xfrm>
           <a:prstGeom prst="rect">
             <a:avLst/>
@@ -979,7 +947,7 @@
         <p:spPr>
           <a:xfrm>
             <a:off x="504000" y="226080"/>
-            <a:ext cx="9070920" cy="945720"/>
+            <a:ext cx="9072000" cy="946440"/>
           </a:xfrm>
           <a:prstGeom prst="rect">
             <a:avLst/>
@@ -1010,7 +978,7 @@
         <p:spPr>
           <a:xfrm>
             <a:off x="504000" y="1326600"/>
-            <a:ext cx="4426920" cy="1568160"/>
+            <a:ext cx="4426920" cy="1568520"/>
           </a:xfrm>
           <a:prstGeom prst="rect">
             <a:avLst/>
@@ -1040,7 +1008,7 @@
         <p:spPr>
           <a:xfrm>
             <a:off x="5152680" y="1326600"/>
-            <a:ext cx="4426920" cy="1568160"/>
+            <a:ext cx="4426920" cy="1568520"/>
           </a:xfrm>
           <a:prstGeom prst="rect">
             <a:avLst/>
@@ -1069,8 +1037,8 @@
         </p:nvSpPr>
         <p:spPr>
           <a:xfrm>
-            <a:off x="504000" y="3044160"/>
-            <a:ext cx="4426920" cy="1568160"/>
+            <a:off x="504000" y="3044520"/>
+            <a:ext cx="4426920" cy="1568520"/>
           </a:xfrm>
           <a:prstGeom prst="rect">
             <a:avLst/>
@@ -1099,8 +1067,8 @@
         </p:nvSpPr>
         <p:spPr>
           <a:xfrm>
-            <a:off x="5152680" y="3044160"/>
-            <a:ext cx="4426920" cy="1568160"/>
+            <a:off x="5152680" y="3044520"/>
+            <a:ext cx="4426920" cy="1568520"/>
           </a:xfrm>
           <a:prstGeom prst="rect">
             <a:avLst/>
@@ -1152,7 +1120,7 @@
         <p:spPr>
           <a:xfrm>
             <a:off x="504000" y="226080"/>
-            <a:ext cx="9070920" cy="945720"/>
+            <a:ext cx="9072000" cy="946440"/>
           </a:xfrm>
           <a:prstGeom prst="rect">
             <a:avLst/>
@@ -1183,7 +1151,7 @@
         <p:spPr>
           <a:xfrm>
             <a:off x="504000" y="1326600"/>
-            <a:ext cx="2920680" cy="1568160"/>
+            <a:ext cx="2921040" cy="1568520"/>
           </a:xfrm>
           <a:prstGeom prst="rect">
             <a:avLst/>
@@ -1212,8 +1180,8 @@
         </p:nvSpPr>
         <p:spPr>
           <a:xfrm>
-            <a:off x="3571200" y="1326600"/>
-            <a:ext cx="2920680" cy="1568160"/>
+            <a:off x="3571560" y="1326600"/>
+            <a:ext cx="2921040" cy="1568520"/>
           </a:xfrm>
           <a:prstGeom prst="rect">
             <a:avLst/>
@@ -1242,8 +1210,8 @@
         </p:nvSpPr>
         <p:spPr>
           <a:xfrm>
-            <a:off x="6638040" y="1326600"/>
-            <a:ext cx="2920680" cy="1568160"/>
+            <a:off x="6639120" y="1326600"/>
+            <a:ext cx="2921040" cy="1568520"/>
           </a:xfrm>
           <a:prstGeom prst="rect">
             <a:avLst/>
@@ -1272,8 +1240,8 @@
         </p:nvSpPr>
         <p:spPr>
           <a:xfrm>
-            <a:off x="504000" y="3044160"/>
-            <a:ext cx="2920680" cy="1568160"/>
+            <a:off x="504000" y="3044520"/>
+            <a:ext cx="2921040" cy="1568520"/>
           </a:xfrm>
           <a:prstGeom prst="rect">
             <a:avLst/>
@@ -1302,8 +1270,8 @@
         </p:nvSpPr>
         <p:spPr>
           <a:xfrm>
-            <a:off x="3571200" y="3044160"/>
-            <a:ext cx="2920680" cy="1568160"/>
+            <a:off x="3571560" y="3044520"/>
+            <a:ext cx="2921040" cy="1568520"/>
           </a:xfrm>
           <a:prstGeom prst="rect">
             <a:avLst/>
@@ -1332,8 +1300,8 @@
         </p:nvSpPr>
         <p:spPr>
           <a:xfrm>
-            <a:off x="6638040" y="3044160"/>
-            <a:ext cx="2920680" cy="1568160"/>
+            <a:off x="6639120" y="3044520"/>
+            <a:ext cx="2921040" cy="1568520"/>
           </a:xfrm>
           <a:prstGeom prst="rect">
             <a:avLst/>
@@ -1385,7 +1353,7 @@
         <p:spPr>
           <a:xfrm>
             <a:off x="504000" y="226080"/>
-            <a:ext cx="9070920" cy="945720"/>
+            <a:ext cx="9072000" cy="946440"/>
           </a:xfrm>
           <a:prstGeom prst="rect">
             <a:avLst/>
@@ -1416,7 +1384,7 @@
         <p:spPr>
           <a:xfrm>
             <a:off x="504000" y="1326600"/>
-            <a:ext cx="9071640" cy="3288240"/>
+            <a:ext cx="9072000" cy="3288600"/>
           </a:xfrm>
           <a:prstGeom prst="rect">
             <a:avLst/>
@@ -1469,7 +1437,7 @@
         <p:spPr>
           <a:xfrm>
             <a:off x="504000" y="226080"/>
-            <a:ext cx="9070920" cy="945720"/>
+            <a:ext cx="9072000" cy="946440"/>
           </a:xfrm>
           <a:prstGeom prst="rect">
             <a:avLst/>
@@ -1500,7 +1468,7 @@
         <p:spPr>
           <a:xfrm>
             <a:off x="504000" y="1326600"/>
-            <a:ext cx="9071640" cy="3288240"/>
+            <a:ext cx="9072000" cy="3288600"/>
           </a:xfrm>
           <a:prstGeom prst="rect">
             <a:avLst/>
@@ -1552,7 +1520,7 @@
         <p:spPr>
           <a:xfrm>
             <a:off x="504000" y="226080"/>
-            <a:ext cx="9070920" cy="945720"/>
+            <a:ext cx="9072000" cy="946440"/>
           </a:xfrm>
           <a:prstGeom prst="rect">
             <a:avLst/>
@@ -1583,7 +1551,7 @@
         <p:spPr>
           <a:xfrm>
             <a:off x="504000" y="1326600"/>
-            <a:ext cx="4426920" cy="3288240"/>
+            <a:ext cx="4426920" cy="3288600"/>
           </a:xfrm>
           <a:prstGeom prst="rect">
             <a:avLst/>
@@ -1613,7 +1581,7 @@
         <p:spPr>
           <a:xfrm>
             <a:off x="5152680" y="1326600"/>
-            <a:ext cx="4426920" cy="3288240"/>
+            <a:ext cx="4426920" cy="3288600"/>
           </a:xfrm>
           <a:prstGeom prst="rect">
             <a:avLst/>
@@ -1665,7 +1633,7 @@
         <p:spPr>
           <a:xfrm>
             <a:off x="504000" y="226080"/>
-            <a:ext cx="9070920" cy="945720"/>
+            <a:ext cx="9072000" cy="946440"/>
           </a:xfrm>
           <a:prstGeom prst="rect">
             <a:avLst/>
@@ -1718,7 +1686,7 @@
         <p:spPr>
           <a:xfrm>
             <a:off x="504000" y="226080"/>
-            <a:ext cx="9070920" cy="4385160"/>
+            <a:ext cx="9072000" cy="4388400"/>
           </a:xfrm>
           <a:prstGeom prst="rect">
             <a:avLst/>
@@ -1771,7 +1739,7 @@
         <p:spPr>
           <a:xfrm>
             <a:off x="504000" y="226080"/>
-            <a:ext cx="9070920" cy="945720"/>
+            <a:ext cx="9072000" cy="946440"/>
           </a:xfrm>
           <a:prstGeom prst="rect">
             <a:avLst/>
@@ -1802,7 +1770,7 @@
         <p:spPr>
           <a:xfrm>
             <a:off x="504000" y="1326600"/>
-            <a:ext cx="4426920" cy="1568160"/>
+            <a:ext cx="4426920" cy="1568520"/>
           </a:xfrm>
           <a:prstGeom prst="rect">
             <a:avLst/>
@@ -1832,7 +1800,7 @@
         <p:spPr>
           <a:xfrm>
             <a:off x="5152680" y="1326600"/>
-            <a:ext cx="4426920" cy="3288240"/>
+            <a:ext cx="4426920" cy="3288600"/>
           </a:xfrm>
           <a:prstGeom prst="rect">
             <a:avLst/>
@@ -1861,8 +1829,8 @@
         </p:nvSpPr>
         <p:spPr>
           <a:xfrm>
-            <a:off x="504000" y="3044160"/>
-            <a:ext cx="4426920" cy="1568160"/>
+            <a:off x="504000" y="3044520"/>
+            <a:ext cx="4426920" cy="1568520"/>
           </a:xfrm>
           <a:prstGeom prst="rect">
             <a:avLst/>
@@ -1914,7 +1882,7 @@
         <p:spPr>
           <a:xfrm>
             <a:off x="504000" y="226080"/>
-            <a:ext cx="9070920" cy="945720"/>
+            <a:ext cx="9072000" cy="946440"/>
           </a:xfrm>
           <a:prstGeom prst="rect">
             <a:avLst/>
@@ -1945,7 +1913,7 @@
         <p:spPr>
           <a:xfrm>
             <a:off x="504000" y="1326600"/>
-            <a:ext cx="4426920" cy="3288240"/>
+            <a:ext cx="4426920" cy="3288600"/>
           </a:xfrm>
           <a:prstGeom prst="rect">
             <a:avLst/>
@@ -1975,7 +1943,7 @@
         <p:spPr>
           <a:xfrm>
             <a:off x="5152680" y="1326600"/>
-            <a:ext cx="4426920" cy="1568160"/>
+            <a:ext cx="4426920" cy="1568520"/>
           </a:xfrm>
           <a:prstGeom prst="rect">
             <a:avLst/>
@@ -2004,8 +1972,8 @@
         </p:nvSpPr>
         <p:spPr>
           <a:xfrm>
-            <a:off x="5152680" y="3044160"/>
-            <a:ext cx="4426920" cy="1568160"/>
+            <a:off x="5152680" y="3044520"/>
+            <a:ext cx="4426920" cy="1568520"/>
           </a:xfrm>
           <a:prstGeom prst="rect">
             <a:avLst/>
@@ -2057,7 +2025,7 @@
         <p:spPr>
           <a:xfrm>
             <a:off x="504000" y="226080"/>
-            <a:ext cx="9070920" cy="945720"/>
+            <a:ext cx="9072000" cy="946440"/>
           </a:xfrm>
           <a:prstGeom prst="rect">
             <a:avLst/>
@@ -2088,7 +2056,7 @@
         <p:spPr>
           <a:xfrm>
             <a:off x="504000" y="1326600"/>
-            <a:ext cx="4426920" cy="1568160"/>
+            <a:ext cx="4426920" cy="1568520"/>
           </a:xfrm>
           <a:prstGeom prst="rect">
             <a:avLst/>
@@ -2118,7 +2086,7 @@
         <p:spPr>
           <a:xfrm>
             <a:off x="5152680" y="1326600"/>
-            <a:ext cx="4426920" cy="1568160"/>
+            <a:ext cx="4426920" cy="1568520"/>
           </a:xfrm>
           <a:prstGeom prst="rect">
             <a:avLst/>
@@ -2147,8 +2115,8 @@
         </p:nvSpPr>
         <p:spPr>
           <a:xfrm>
-            <a:off x="504000" y="3044160"/>
-            <a:ext cx="9071640" cy="1568160"/>
+            <a:off x="504000" y="3044520"/>
+            <a:ext cx="9072000" cy="1568520"/>
           </a:xfrm>
           <a:prstGeom prst="rect">
             <a:avLst/>
@@ -2200,7 +2168,7 @@
         <p:spPr>
           <a:xfrm>
             <a:off x="504000" y="226080"/>
-            <a:ext cx="9070920" cy="945720"/>
+            <a:ext cx="9072000" cy="946440"/>
           </a:xfrm>
           <a:prstGeom prst="rect">
             <a:avLst/>
@@ -2213,12 +2181,12 @@
           <a:p>
             <a:pPr algn="ctr"/>
             <a:r>
-              <a:rPr b="0" lang="en-US" sz="1800" spc="-1" strike="noStrike">
+              <a:rPr b="0" lang="en-US" sz="4400" spc="-1" strike="noStrike">
                 <a:latin typeface="Arial"/>
               </a:rPr>
               <a:t>Click to edit the title text format</a:t>
             </a:r>
-            <a:endParaRPr b="0" lang="en-US" sz="1800" spc="-1" strike="noStrike">
+            <a:endParaRPr b="0" lang="en-US" sz="4400" spc="-1" strike="noStrike">
               <a:latin typeface="Arial"/>
             </a:endParaRPr>
           </a:p>
@@ -2237,7 +2205,7 @@
         <p:spPr>
           <a:xfrm>
             <a:off x="504000" y="1326600"/>
-            <a:ext cx="9071640" cy="3288240"/>
+            <a:ext cx="9072000" cy="3288600"/>
           </a:xfrm>
           <a:prstGeom prst="rect">
             <a:avLst/>
@@ -2248,7 +2216,7 @@
             <a:normAutofit/>
           </a:bodyPr>
           <a:p>
-            <a:pPr marL="432000" indent="-324000" algn="ctr">
+            <a:pPr marL="432000" indent="-324000">
               <a:spcBef>
                 <a:spcPts val="1417"/>
               </a:spcBef>
@@ -2260,17 +2228,17 @@
               <a:buChar char=""/>
             </a:pPr>
             <a:r>
-              <a:rPr b="0" lang="en-US" sz="1800" spc="-1" strike="noStrike">
+              <a:rPr b="0" lang="en-US" sz="3200" spc="-1" strike="noStrike">
                 <a:latin typeface="Arial"/>
               </a:rPr>
               <a:t>Click to edit the outline text format</a:t>
             </a:r>
-            <a:endParaRPr b="0" lang="en-US" sz="1800" spc="-1" strike="noStrike">
-              <a:latin typeface="Arial"/>
-            </a:endParaRPr>
-          </a:p>
-          <a:p>
-            <a:pPr lvl="1" marL="864000" indent="-324000" algn="ctr">
+            <a:endParaRPr b="0" lang="en-US" sz="3200" spc="-1" strike="noStrike">
+              <a:latin typeface="Arial"/>
+            </a:endParaRPr>
+          </a:p>
+          <a:p>
+            <a:pPr lvl="1" marL="864000" indent="-324000">
               <a:spcBef>
                 <a:spcPts val="1134"/>
               </a:spcBef>
@@ -2282,17 +2250,17 @@
               <a:buChar char=""/>
             </a:pPr>
             <a:r>
-              <a:rPr b="0" lang="en-US" sz="1800" spc="-1" strike="noStrike">
+              <a:rPr b="0" lang="en-US" sz="2800" spc="-1" strike="noStrike">
                 <a:latin typeface="Arial"/>
               </a:rPr>
               <a:t>Second Outline Level</a:t>
             </a:r>
-            <a:endParaRPr b="0" lang="en-US" sz="1800" spc="-1" strike="noStrike">
-              <a:latin typeface="Arial"/>
-            </a:endParaRPr>
-          </a:p>
-          <a:p>
-            <a:pPr lvl="2" marL="1296000" indent="-288000" algn="ctr">
+            <a:endParaRPr b="0" lang="en-US" sz="2800" spc="-1" strike="noStrike">
+              <a:latin typeface="Arial"/>
+            </a:endParaRPr>
+          </a:p>
+          <a:p>
+            <a:pPr lvl="2" marL="1296000" indent="-288000">
               <a:spcBef>
                 <a:spcPts val="850"/>
               </a:spcBef>
@@ -2304,17 +2272,17 @@
               <a:buChar char=""/>
             </a:pPr>
             <a:r>
-              <a:rPr b="0" lang="en-US" sz="1800" spc="-1" strike="noStrike">
+              <a:rPr b="0" lang="en-US" sz="2400" spc="-1" strike="noStrike">
                 <a:latin typeface="Arial"/>
               </a:rPr>
               <a:t>Third Outline Level</a:t>
             </a:r>
-            <a:endParaRPr b="0" lang="en-US" sz="1800" spc="-1" strike="noStrike">
-              <a:latin typeface="Arial"/>
-            </a:endParaRPr>
-          </a:p>
-          <a:p>
-            <a:pPr lvl="3" marL="1728000" indent="-216000" algn="ctr">
+            <a:endParaRPr b="0" lang="en-US" sz="2400" spc="-1" strike="noStrike">
+              <a:latin typeface="Arial"/>
+            </a:endParaRPr>
+          </a:p>
+          <a:p>
+            <a:pPr lvl="3" marL="1728000" indent="-216000">
               <a:spcBef>
                 <a:spcPts val="567"/>
               </a:spcBef>
@@ -2326,17 +2294,17 @@
               <a:buChar char=""/>
             </a:pPr>
             <a:r>
-              <a:rPr b="0" lang="en-US" sz="1800" spc="-1" strike="noStrike">
+              <a:rPr b="0" lang="en-US" sz="2000" spc="-1" strike="noStrike">
                 <a:latin typeface="Arial"/>
               </a:rPr>
               <a:t>Fourth Outline Level</a:t>
             </a:r>
-            <a:endParaRPr b="0" lang="en-US" sz="1800" spc="-1" strike="noStrike">
-              <a:latin typeface="Arial"/>
-            </a:endParaRPr>
-          </a:p>
-          <a:p>
-            <a:pPr lvl="4" marL="2160000" indent="-216000" algn="ctr">
+            <a:endParaRPr b="0" lang="en-US" sz="2000" spc="-1" strike="noStrike">
+              <a:latin typeface="Arial"/>
+            </a:endParaRPr>
+          </a:p>
+          <a:p>
+            <a:pPr lvl="4" marL="2160000" indent="-216000">
               <a:spcBef>
                 <a:spcPts val="283"/>
               </a:spcBef>
@@ -2348,17 +2316,17 @@
               <a:buChar char=""/>
             </a:pPr>
             <a:r>
-              <a:rPr b="0" lang="en-US" sz="1800" spc="-1" strike="noStrike">
+              <a:rPr b="0" lang="en-US" sz="2000" spc="-1" strike="noStrike">
                 <a:latin typeface="Arial"/>
               </a:rPr>
               <a:t>Fifth Outline Level</a:t>
             </a:r>
-            <a:endParaRPr b="0" lang="en-US" sz="1800" spc="-1" strike="noStrike">
-              <a:latin typeface="Arial"/>
-            </a:endParaRPr>
-          </a:p>
-          <a:p>
-            <a:pPr lvl="5" marL="2592000" indent="-216000" algn="ctr">
+            <a:endParaRPr b="0" lang="en-US" sz="2000" spc="-1" strike="noStrike">
+              <a:latin typeface="Arial"/>
+            </a:endParaRPr>
+          </a:p>
+          <a:p>
+            <a:pPr lvl="5" marL="2592000" indent="-216000">
               <a:spcBef>
                 <a:spcPts val="283"/>
               </a:spcBef>
@@ -2370,17 +2338,17 @@
               <a:buChar char=""/>
             </a:pPr>
             <a:r>
-              <a:rPr b="0" lang="en-US" sz="1800" spc="-1" strike="noStrike">
+              <a:rPr b="0" lang="en-US" sz="2000" spc="-1" strike="noStrike">
                 <a:latin typeface="Arial"/>
               </a:rPr>
               <a:t>Sixth Outline Level</a:t>
             </a:r>
-            <a:endParaRPr b="0" lang="en-US" sz="1800" spc="-1" strike="noStrike">
-              <a:latin typeface="Arial"/>
-            </a:endParaRPr>
-          </a:p>
-          <a:p>
-            <a:pPr lvl="6" marL="3024000" indent="-216000" algn="ctr">
+            <a:endParaRPr b="0" lang="en-US" sz="2000" spc="-1" strike="noStrike">
+              <a:latin typeface="Arial"/>
+            </a:endParaRPr>
+          </a:p>
+          <a:p>
+            <a:pPr lvl="6" marL="3024000" indent="-216000">
               <a:spcBef>
                 <a:spcPts val="283"/>
               </a:spcBef>
@@ -2392,12 +2360,12 @@
               <a:buChar char=""/>
             </a:pPr>
             <a:r>
-              <a:rPr b="0" lang="en-US" sz="1800" spc="-1" strike="noStrike">
+              <a:rPr b="0" lang="en-US" sz="2000" spc="-1" strike="noStrike">
                 <a:latin typeface="Arial"/>
               </a:rPr>
               <a:t>Seventh Outline Level</a:t>
             </a:r>
-            <a:endParaRPr b="0" lang="en-US" sz="1800" spc="-1" strike="noStrike">
+            <a:endParaRPr b="0" lang="en-US" sz="2000" spc="-1" strike="noStrike">
               <a:latin typeface="Arial"/>
             </a:endParaRPr>
           </a:p>
@@ -2452,8 +2420,8 @@
         </p:blipFill>
         <p:spPr>
           <a:xfrm>
-            <a:off x="810360" y="687600"/>
-            <a:ext cx="8457120" cy="4294800"/>
+            <a:off x="805680" y="268200"/>
+            <a:ext cx="8457840" cy="5133600"/>
           </a:xfrm>
           <a:prstGeom prst="rect">
             <a:avLst/>
@@ -2463,70 +2431,6 @@
           </a:ln>
         </p:spPr>
       </p:pic>
-      <p:sp>
-        <p:nvSpPr>
-          <p:cNvPr id="45" name="CustomShape 1"/>
-          <p:cNvSpPr/>
-          <p:nvPr/>
-        </p:nvSpPr>
-        <p:spPr>
-          <a:xfrm>
-            <a:off x="3749040" y="822960"/>
-            <a:ext cx="639360" cy="551520"/>
-          </a:xfrm>
-          <a:prstGeom prst="donut">
-            <a:avLst>
-              <a:gd name="adj" fmla="val 11490"/>
-            </a:avLst>
-          </a:prstGeom>
-          <a:solidFill>
-            <a:srgbClr val="ff0000"/>
-          </a:solidFill>
-          <a:ln>
-            <a:solidFill>
-              <a:srgbClr val="3465a4"/>
-            </a:solidFill>
-          </a:ln>
-        </p:spPr>
-        <p:style>
-          <a:lnRef idx="0"/>
-          <a:fillRef idx="0"/>
-          <a:effectRef idx="0"/>
-          <a:fontRef idx="minor"/>
-        </p:style>
-      </p:sp>
-      <p:sp>
-        <p:nvSpPr>
-          <p:cNvPr id="46" name="CustomShape 2"/>
-          <p:cNvSpPr/>
-          <p:nvPr/>
-        </p:nvSpPr>
-        <p:spPr>
-          <a:xfrm>
-            <a:off x="1337400" y="2731320"/>
-            <a:ext cx="639360" cy="551520"/>
-          </a:xfrm>
-          <a:prstGeom prst="donut">
-            <a:avLst>
-              <a:gd name="adj" fmla="val 11490"/>
-            </a:avLst>
-          </a:prstGeom>
-          <a:solidFill>
-            <a:srgbClr val="00a933"/>
-          </a:solidFill>
-          <a:ln>
-            <a:solidFill>
-              <a:srgbClr val="3465a4"/>
-            </a:solidFill>
-          </a:ln>
-        </p:spPr>
-        <p:style>
-          <a:lnRef idx="0"/>
-          <a:fillRef idx="0"/>
-          <a:effectRef idx="0"/>
-          <a:fontRef idx="minor"/>
-        </p:style>
-      </p:sp>
     </p:spTree>
   </p:cSld>
   <mc:AlternateContent>
@@ -2559,7 +2463,7 @@
       </p:grpSpPr>
       <p:pic>
         <p:nvPicPr>
-          <p:cNvPr id="47" name="" descr=""/>
+          <p:cNvPr id="45" name="" descr=""/>
           <p:cNvPicPr/>
           <p:nvPr/>
         </p:nvPicPr>
@@ -2569,8 +2473,8 @@
         </p:blipFill>
         <p:spPr>
           <a:xfrm>
-            <a:off x="821520" y="687600"/>
-            <a:ext cx="8457120" cy="4294800"/>
+            <a:off x="805680" y="268200"/>
+            <a:ext cx="8457840" cy="5133600"/>
           </a:xfrm>
           <a:prstGeom prst="rect">
             <a:avLst/>
@@ -2582,118 +2486,22 @@
       </p:pic>
       <p:sp>
         <p:nvSpPr>
-          <p:cNvPr id="48" name="CustomShape 1"/>
+          <p:cNvPr id="46" name="CustomShape 1"/>
           <p:cNvSpPr/>
           <p:nvPr/>
         </p:nvSpPr>
         <p:spPr>
           <a:xfrm>
-            <a:off x="2468880" y="3013920"/>
-            <a:ext cx="639360" cy="551520"/>
+            <a:off x="1391040" y="2350800"/>
+            <a:ext cx="548280" cy="428040"/>
           </a:xfrm>
           <a:prstGeom prst="donut">
             <a:avLst>
-              <a:gd name="adj" fmla="val 11490"/>
+              <a:gd name="adj" fmla="val 11263"/>
             </a:avLst>
           </a:prstGeom>
           <a:solidFill>
-            <a:srgbClr val="ff0000"/>
-          </a:solidFill>
-          <a:ln>
-            <a:solidFill>
-              <a:srgbClr val="3465a4"/>
-            </a:solidFill>
-          </a:ln>
-        </p:spPr>
-        <p:style>
-          <a:lnRef idx="0"/>
-          <a:fillRef idx="0"/>
-          <a:effectRef idx="0"/>
-          <a:fontRef idx="minor"/>
-        </p:style>
-      </p:sp>
-      <p:sp>
-        <p:nvSpPr>
-          <p:cNvPr id="49" name="CustomShape 2"/>
-          <p:cNvSpPr/>
-          <p:nvPr/>
-        </p:nvSpPr>
-        <p:spPr>
-          <a:xfrm>
-            <a:off x="3840480" y="3034080"/>
-            <a:ext cx="639360" cy="551520"/>
-          </a:xfrm>
-          <a:prstGeom prst="donut">
-            <a:avLst>
-              <a:gd name="adj" fmla="val 11490"/>
-            </a:avLst>
-          </a:prstGeom>
-          <a:solidFill>
-            <a:srgbClr val="ff0000"/>
-          </a:solidFill>
-          <a:ln>
-            <a:solidFill>
-              <a:srgbClr val="3465a4"/>
-            </a:solidFill>
-          </a:ln>
-        </p:spPr>
-        <p:style>
-          <a:lnRef idx="0"/>
-          <a:fillRef idx="0"/>
-          <a:effectRef idx="0"/>
-          <a:fontRef idx="minor"/>
-        </p:style>
-      </p:sp>
-      <p:sp>
-        <p:nvSpPr>
-          <p:cNvPr id="50" name="CustomShape 3"/>
-          <p:cNvSpPr/>
-          <p:nvPr/>
-        </p:nvSpPr>
-        <p:spPr>
-          <a:xfrm>
-            <a:off x="1353240" y="2726280"/>
-            <a:ext cx="639360" cy="551520"/>
-          </a:xfrm>
-          <a:prstGeom prst="donut">
-            <a:avLst>
-              <a:gd name="adj" fmla="val 11490"/>
-            </a:avLst>
-          </a:prstGeom>
-          <a:solidFill>
-            <a:srgbClr val="00a933"/>
-          </a:solidFill>
-          <a:ln>
-            <a:solidFill>
-              <a:srgbClr val="3465a4"/>
-            </a:solidFill>
-          </a:ln>
-        </p:spPr>
-        <p:style>
-          <a:lnRef idx="0"/>
-          <a:fillRef idx="0"/>
-          <a:effectRef idx="0"/>
-          <a:fontRef idx="minor"/>
-        </p:style>
-      </p:sp>
-      <p:sp>
-        <p:nvSpPr>
-          <p:cNvPr id="51" name="CustomShape 4"/>
-          <p:cNvSpPr/>
-          <p:nvPr/>
-        </p:nvSpPr>
-        <p:spPr>
-          <a:xfrm>
-            <a:off x="4845600" y="2762640"/>
-            <a:ext cx="639360" cy="473040"/>
-          </a:xfrm>
-          <a:prstGeom prst="donut">
-            <a:avLst>
-              <a:gd name="adj" fmla="val 11490"/>
-            </a:avLst>
-          </a:prstGeom>
-          <a:solidFill>
-            <a:srgbClr val="00a933"/>
+            <a:srgbClr val="729fcf"/>
           </a:solidFill>
           <a:ln>
             <a:solidFill>
@@ -2740,7 +2548,7 @@
       </p:grpSpPr>
       <p:pic>
         <p:nvPicPr>
-          <p:cNvPr id="52" name="" descr=""/>
+          <p:cNvPr id="47" name="" descr=""/>
           <p:cNvPicPr/>
           <p:nvPr/>
         </p:nvPicPr>
@@ -2750,8 +2558,8 @@
         </p:blipFill>
         <p:spPr>
           <a:xfrm>
-            <a:off x="821520" y="687600"/>
-            <a:ext cx="8457120" cy="4294800"/>
+            <a:off x="805680" y="268200"/>
+            <a:ext cx="8457840" cy="5133600"/>
           </a:xfrm>
           <a:prstGeom prst="rect">
             <a:avLst/>
@@ -2763,118 +2571,22 @@
       </p:pic>
       <p:sp>
         <p:nvSpPr>
-          <p:cNvPr id="53" name="CustomShape 1"/>
+          <p:cNvPr id="48" name="CustomShape 1"/>
           <p:cNvSpPr/>
           <p:nvPr/>
         </p:nvSpPr>
         <p:spPr>
           <a:xfrm>
-            <a:off x="7223760" y="4294080"/>
-            <a:ext cx="639360" cy="551520"/>
+            <a:off x="4631040" y="190800"/>
+            <a:ext cx="946440" cy="428040"/>
           </a:xfrm>
           <a:prstGeom prst="donut">
             <a:avLst>
-              <a:gd name="adj" fmla="val 11490"/>
+              <a:gd name="adj" fmla="val 11263"/>
             </a:avLst>
           </a:prstGeom>
           <a:solidFill>
-            <a:srgbClr val="ff0000"/>
-          </a:solidFill>
-          <a:ln>
-            <a:solidFill>
-              <a:srgbClr val="3465a4"/>
-            </a:solidFill>
-          </a:ln>
-        </p:spPr>
-        <p:style>
-          <a:lnRef idx="0"/>
-          <a:fillRef idx="0"/>
-          <a:effectRef idx="0"/>
-          <a:fontRef idx="minor"/>
-        </p:style>
-      </p:sp>
-      <p:sp>
-        <p:nvSpPr>
-          <p:cNvPr id="54" name="CustomShape 2"/>
-          <p:cNvSpPr/>
-          <p:nvPr/>
-        </p:nvSpPr>
-        <p:spPr>
-          <a:xfrm>
-            <a:off x="1920240" y="4297680"/>
-            <a:ext cx="639360" cy="551520"/>
-          </a:xfrm>
-          <a:prstGeom prst="donut">
-            <a:avLst>
-              <a:gd name="adj" fmla="val 11490"/>
-            </a:avLst>
-          </a:prstGeom>
-          <a:solidFill>
-            <a:srgbClr val="ff0000"/>
-          </a:solidFill>
-          <a:ln>
-            <a:solidFill>
-              <a:srgbClr val="3465a4"/>
-            </a:solidFill>
-          </a:ln>
-        </p:spPr>
-        <p:style>
-          <a:lnRef idx="0"/>
-          <a:fillRef idx="0"/>
-          <a:effectRef idx="0"/>
-          <a:fontRef idx="minor"/>
-        </p:style>
-      </p:sp>
-      <p:sp>
-        <p:nvSpPr>
-          <p:cNvPr id="55" name="CustomShape 3"/>
-          <p:cNvSpPr/>
-          <p:nvPr/>
-        </p:nvSpPr>
-        <p:spPr>
-          <a:xfrm>
-            <a:off x="1344600" y="2714040"/>
-            <a:ext cx="639360" cy="551520"/>
-          </a:xfrm>
-          <a:prstGeom prst="donut">
-            <a:avLst>
-              <a:gd name="adj" fmla="val 11490"/>
-            </a:avLst>
-          </a:prstGeom>
-          <a:solidFill>
-            <a:srgbClr val="00a933"/>
-          </a:solidFill>
-          <a:ln>
-            <a:solidFill>
-              <a:srgbClr val="3465a4"/>
-            </a:solidFill>
-          </a:ln>
-        </p:spPr>
-        <p:style>
-          <a:lnRef idx="0"/>
-          <a:fillRef idx="0"/>
-          <a:effectRef idx="0"/>
-          <a:fontRef idx="minor"/>
-        </p:style>
-      </p:sp>
-      <p:sp>
-        <p:nvSpPr>
-          <p:cNvPr id="56" name="CustomShape 4"/>
-          <p:cNvSpPr/>
-          <p:nvPr/>
-        </p:nvSpPr>
-        <p:spPr>
-          <a:xfrm>
-            <a:off x="8076960" y="2714400"/>
-            <a:ext cx="639360" cy="551520"/>
-          </a:xfrm>
-          <a:prstGeom prst="donut">
-            <a:avLst>
-              <a:gd name="adj" fmla="val 11490"/>
-            </a:avLst>
-          </a:prstGeom>
-          <a:solidFill>
-            <a:srgbClr val="00a933"/>
+            <a:srgbClr val="729fcf"/>
           </a:solidFill>
           <a:ln>
             <a:solidFill>
@@ -2921,7 +2633,7 @@
       </p:grpSpPr>
       <p:pic>
         <p:nvPicPr>
-          <p:cNvPr id="57" name="" descr=""/>
+          <p:cNvPr id="49" name="" descr=""/>
           <p:cNvPicPr/>
           <p:nvPr/>
         </p:nvPicPr>
@@ -2931,8 +2643,8 @@
         </p:blipFill>
         <p:spPr>
           <a:xfrm>
-            <a:off x="821520" y="687600"/>
-            <a:ext cx="8457120" cy="4294800"/>
+            <a:off x="805680" y="268200"/>
+            <a:ext cx="8457840" cy="5133600"/>
           </a:xfrm>
           <a:prstGeom prst="rect">
             <a:avLst/>
@@ -2944,118 +2656,22 @@
       </p:pic>
       <p:sp>
         <p:nvSpPr>
-          <p:cNvPr id="58" name="CustomShape 1"/>
+          <p:cNvPr id="50" name="CustomShape 1"/>
           <p:cNvSpPr/>
           <p:nvPr/>
         </p:nvSpPr>
         <p:spPr>
           <a:xfrm>
-            <a:off x="6881400" y="3019320"/>
-            <a:ext cx="639360" cy="551520"/>
+            <a:off x="4847040" y="3970800"/>
+            <a:ext cx="730440" cy="428040"/>
           </a:xfrm>
           <a:prstGeom prst="donut">
             <a:avLst>
-              <a:gd name="adj" fmla="val 11490"/>
+              <a:gd name="adj" fmla="val 11263"/>
             </a:avLst>
           </a:prstGeom>
           <a:solidFill>
-            <a:srgbClr val="ff0000"/>
-          </a:solidFill>
-          <a:ln>
-            <a:solidFill>
-              <a:srgbClr val="3465a4"/>
-            </a:solidFill>
-          </a:ln>
-        </p:spPr>
-        <p:style>
-          <a:lnRef idx="0"/>
-          <a:fillRef idx="0"/>
-          <a:effectRef idx="0"/>
-          <a:fontRef idx="minor"/>
-        </p:style>
-      </p:sp>
-      <p:sp>
-        <p:nvSpPr>
-          <p:cNvPr id="59" name="CustomShape 2"/>
-          <p:cNvSpPr/>
-          <p:nvPr/>
-        </p:nvSpPr>
-        <p:spPr>
-          <a:xfrm>
-            <a:off x="5873400" y="3019320"/>
-            <a:ext cx="639360" cy="551520"/>
-          </a:xfrm>
-          <a:prstGeom prst="donut">
-            <a:avLst>
-              <a:gd name="adj" fmla="val 11490"/>
-            </a:avLst>
-          </a:prstGeom>
-          <a:solidFill>
-            <a:srgbClr val="ff0000"/>
-          </a:solidFill>
-          <a:ln>
-            <a:solidFill>
-              <a:srgbClr val="3465a4"/>
-            </a:solidFill>
-          </a:ln>
-        </p:spPr>
-        <p:style>
-          <a:lnRef idx="0"/>
-          <a:fillRef idx="0"/>
-          <a:effectRef idx="0"/>
-          <a:fontRef idx="minor"/>
-        </p:style>
-      </p:sp>
-      <p:sp>
-        <p:nvSpPr>
-          <p:cNvPr id="60" name="CustomShape 3"/>
-          <p:cNvSpPr/>
-          <p:nvPr/>
-        </p:nvSpPr>
-        <p:spPr>
-          <a:xfrm>
-            <a:off x="4872960" y="2714400"/>
-            <a:ext cx="639360" cy="551520"/>
-          </a:xfrm>
-          <a:prstGeom prst="donut">
-            <a:avLst>
-              <a:gd name="adj" fmla="val 11490"/>
-            </a:avLst>
-          </a:prstGeom>
-          <a:solidFill>
-            <a:srgbClr val="00a933"/>
-          </a:solidFill>
-          <a:ln>
-            <a:solidFill>
-              <a:srgbClr val="3465a4"/>
-            </a:solidFill>
-          </a:ln>
-        </p:spPr>
-        <p:style>
-          <a:lnRef idx="0"/>
-          <a:fillRef idx="0"/>
-          <a:effectRef idx="0"/>
-          <a:fontRef idx="minor"/>
-        </p:style>
-      </p:sp>
-      <p:sp>
-        <p:nvSpPr>
-          <p:cNvPr id="61" name="CustomShape 4"/>
-          <p:cNvSpPr/>
-          <p:nvPr/>
-        </p:nvSpPr>
-        <p:spPr>
-          <a:xfrm>
-            <a:off x="8077320" y="2714760"/>
-            <a:ext cx="639360" cy="551520"/>
-          </a:xfrm>
-          <a:prstGeom prst="donut">
-            <a:avLst>
-              <a:gd name="adj" fmla="val 11490"/>
-            </a:avLst>
-          </a:prstGeom>
-          <a:solidFill>
-            <a:srgbClr val="00a933"/>
+            <a:srgbClr val="729fcf"/>
           </a:solidFill>
           <a:ln>
             <a:solidFill>
@@ -3102,7 +2718,7 @@
       </p:grpSpPr>
       <p:pic>
         <p:nvPicPr>
-          <p:cNvPr id="62" name="" descr=""/>
+          <p:cNvPr id="51" name="" descr=""/>
           <p:cNvPicPr/>
           <p:nvPr/>
         </p:nvPicPr>
@@ -3112,8 +2728,8 @@
         </p:blipFill>
         <p:spPr>
           <a:xfrm>
-            <a:off x="821520" y="687600"/>
-            <a:ext cx="8457120" cy="4294800"/>
+            <a:off x="805680" y="268200"/>
+            <a:ext cx="8457840" cy="5133600"/>
           </a:xfrm>
           <a:prstGeom prst="rect">
             <a:avLst/>
@@ -3125,22 +2741,22 @@
       </p:pic>
       <p:sp>
         <p:nvSpPr>
-          <p:cNvPr id="63" name="CustomShape 1"/>
+          <p:cNvPr id="52" name="CustomShape 1"/>
           <p:cNvSpPr/>
           <p:nvPr/>
         </p:nvSpPr>
         <p:spPr>
           <a:xfrm>
-            <a:off x="5909400" y="823320"/>
-            <a:ext cx="639360" cy="551520"/>
+            <a:off x="4883040" y="2386800"/>
+            <a:ext cx="548280" cy="428040"/>
           </a:xfrm>
           <a:prstGeom prst="donut">
             <a:avLst>
-              <a:gd name="adj" fmla="val 11490"/>
+              <a:gd name="adj" fmla="val 11263"/>
             </a:avLst>
           </a:prstGeom>
           <a:solidFill>
-            <a:srgbClr val="ff0000"/>
+            <a:srgbClr val="729fcf"/>
           </a:solidFill>
           <a:ln>
             <a:solidFill>
@@ -3155,24 +2771,77 @@
           <a:fontRef idx="minor"/>
         </p:style>
       </p:sp>
-      <p:sp>
-        <p:nvSpPr>
-          <p:cNvPr id="64" name="CustomShape 2"/>
+    </p:spTree>
+  </p:cSld>
+  <mc:AlternateContent>
+    <mc:Choice Requires="p14">
+      <p:transition spd="slow" p14:dur="2000"/>
+    </mc:Choice>
+    <mc:Fallback>
+      <p:transition spd="slow"/>
+    </mc:Fallback>
+  </mc:AlternateContent>
+</p:sld>
+</file>
+
+<file path=ppt/slides/slide6.xml><?xml version="1.0" encoding="utf-8"?>
+<p:sld xmlns:a="http://schemas.openxmlformats.org/drawingml/2006/main" xmlns:p="http://schemas.openxmlformats.org/presentationml/2006/main" xmlns:r="http://schemas.openxmlformats.org/officeDocument/2006/relationships" xmlns:p14="http://schemas.microsoft.com/office/powerpoint/2010/main" xmlns:p15="http://schemas.microsoft.com/office/powerpoint/2012/main" xmlns:mc="http://schemas.openxmlformats.org/markup-compatibility/2006">
+  <p:cSld>
+    <p:spTree>
+      <p:nvGrpSpPr>
+        <p:cNvPr id="1" name=""/>
+        <p:cNvGrpSpPr/>
+        <p:nvPr/>
+      </p:nvGrpSpPr>
+      <p:grpSpPr>
+        <a:xfrm>
+          <a:off x="0" y="0"/>
+          <a:ext cx="0" cy="0"/>
+          <a:chOff x="0" y="0"/>
+          <a:chExt cx="0" cy="0"/>
+        </a:xfrm>
+      </p:grpSpPr>
+      <p:pic>
+        <p:nvPicPr>
+          <p:cNvPr id="53" name="" descr=""/>
+          <p:cNvPicPr/>
+          <p:nvPr/>
+        </p:nvPicPr>
+        <p:blipFill>
+          <a:blip r:embed="rId1"/>
+          <a:stretch/>
+        </p:blipFill>
+        <p:spPr>
+          <a:xfrm>
+            <a:off x="805680" y="268200"/>
+            <a:ext cx="8457840" cy="5133600"/>
+          </a:xfrm>
+          <a:prstGeom prst="rect">
+            <a:avLst/>
+          </a:prstGeom>
+          <a:ln>
+            <a:noFill/>
+          </a:ln>
+        </p:spPr>
+      </p:pic>
+      <p:sp>
+        <p:nvSpPr>
+          <p:cNvPr id="54" name="CustomShape 1"/>
           <p:cNvSpPr/>
           <p:nvPr/>
         </p:nvSpPr>
         <p:spPr>
           <a:xfrm>
-            <a:off x="8077320" y="2714760"/>
-            <a:ext cx="639360" cy="551520"/>
+            <a:off x="8051040" y="2386800"/>
+            <a:ext cx="730440" cy="428040"/>
           </a:xfrm>
           <a:prstGeom prst="donut">
             <a:avLst>
-              <a:gd name="adj" fmla="val 11490"/>
+              <a:gd name="adj" fmla="val 11263"/>
             </a:avLst>
           </a:prstGeom>
           <a:solidFill>
-            <a:srgbClr val="00a933"/>
+            <a:srgbClr val="729fcf"/>
           </a:solidFill>
           <a:ln>
             <a:solidFill>

</xml_diff>